<commit_message>
Update to alloknesis demonstration protocol
</commit_message>
<xml_diff>
--- a/docs/alloknesisDemo/Illustrations.pptx
+++ b/docs/alloknesisDemo/Illustrations.pptx
@@ -4,10 +4,16 @@
   <p:sldMasterIdLst>
     <p:sldMasterId id="2147483648" r:id="rId1"/>
   </p:sldMasterIdLst>
+  <p:notesMasterIdLst>
+    <p:notesMasterId r:id="rId8"/>
+  </p:notesMasterIdLst>
   <p:sldIdLst>
     <p:sldId id="256" r:id="rId2"/>
     <p:sldId id="257" r:id="rId3"/>
     <p:sldId id="258" r:id="rId4"/>
+    <p:sldId id="259" r:id="rId5"/>
+    <p:sldId id="261" r:id="rId6"/>
+    <p:sldId id="260" r:id="rId7"/>
   </p:sldIdLst>
   <p:sldSz cx="12192000" cy="6858000"/>
   <p:notesSz cx="6858000" cy="9144000"/>
@@ -114,6 +120,444 @@
 </p:presentation>
 </file>
 
+<file path=ppt/notesMasters/notesMaster1.xml><?xml version="1.0" encoding="utf-8"?>
+<p:notesMaster xmlns:a="http://schemas.openxmlformats.org/drawingml/2006/main" xmlns:r="http://schemas.openxmlformats.org/officeDocument/2006/relationships" xmlns:p="http://schemas.openxmlformats.org/presentationml/2006/main">
+  <p:cSld>
+    <p:bg>
+      <p:bgRef idx="1001">
+        <a:schemeClr val="bg1"/>
+      </p:bgRef>
+    </p:bg>
+    <p:spTree>
+      <p:nvGrpSpPr>
+        <p:cNvPr id="1" name=""/>
+        <p:cNvGrpSpPr/>
+        <p:nvPr/>
+      </p:nvGrpSpPr>
+      <p:grpSpPr>
+        <a:xfrm>
+          <a:off x="0" y="0"/>
+          <a:ext cx="0" cy="0"/>
+          <a:chOff x="0" y="0"/>
+          <a:chExt cx="0" cy="0"/>
+        </a:xfrm>
+      </p:grpSpPr>
+      <p:sp>
+        <p:nvSpPr>
+          <p:cNvPr id="2" name="Header Placeholder 1"/>
+          <p:cNvSpPr>
+            <a:spLocks noGrp="1"/>
+          </p:cNvSpPr>
+          <p:nvPr>
+            <p:ph type="hdr" sz="quarter"/>
+          </p:nvPr>
+        </p:nvSpPr>
+        <p:spPr>
+          <a:xfrm>
+            <a:off x="0" y="0"/>
+            <a:ext cx="2971800" cy="458788"/>
+          </a:xfrm>
+          <a:prstGeom prst="rect">
+            <a:avLst/>
+          </a:prstGeom>
+        </p:spPr>
+        <p:txBody>
+          <a:bodyPr vert="horz" lIns="91440" tIns="45720" rIns="91440" bIns="45720" rtlCol="0"/>
+          <a:lstStyle>
+            <a:lvl1pPr algn="l">
+              <a:defRPr sz="1200"/>
+            </a:lvl1pPr>
+          </a:lstStyle>
+          <a:p>
+            <a:endParaRPr lang="en-DK"/>
+          </a:p>
+        </p:txBody>
+      </p:sp>
+      <p:sp>
+        <p:nvSpPr>
+          <p:cNvPr id="3" name="Date Placeholder 2"/>
+          <p:cNvSpPr>
+            <a:spLocks noGrp="1"/>
+          </p:cNvSpPr>
+          <p:nvPr>
+            <p:ph type="dt" idx="1"/>
+          </p:nvPr>
+        </p:nvSpPr>
+        <p:spPr>
+          <a:xfrm>
+            <a:off x="3884613" y="0"/>
+            <a:ext cx="2971800" cy="458788"/>
+          </a:xfrm>
+          <a:prstGeom prst="rect">
+            <a:avLst/>
+          </a:prstGeom>
+        </p:spPr>
+        <p:txBody>
+          <a:bodyPr vert="horz" lIns="91440" tIns="45720" rIns="91440" bIns="45720" rtlCol="0"/>
+          <a:lstStyle>
+            <a:lvl1pPr algn="r">
+              <a:defRPr sz="1200"/>
+            </a:lvl1pPr>
+          </a:lstStyle>
+          <a:p>
+            <a:fld id="{AD18F073-7BE0-4F74-9518-670EA3BF62D9}" type="datetimeFigureOut">
+              <a:rPr lang="en-DK" smtClean="0"/>
+              <a:t>20/04/2024</a:t>
+            </a:fld>
+            <a:endParaRPr lang="en-DK"/>
+          </a:p>
+        </p:txBody>
+      </p:sp>
+      <p:sp>
+        <p:nvSpPr>
+          <p:cNvPr id="4" name="Slide Image Placeholder 3"/>
+          <p:cNvSpPr>
+            <a:spLocks noGrp="1" noRot="1" noChangeAspect="1"/>
+          </p:cNvSpPr>
+          <p:nvPr>
+            <p:ph type="sldImg" idx="2"/>
+          </p:nvPr>
+        </p:nvSpPr>
+        <p:spPr>
+          <a:xfrm>
+            <a:off x="685800" y="1143000"/>
+            <a:ext cx="5486400" cy="3086100"/>
+          </a:xfrm>
+          <a:prstGeom prst="rect">
+            <a:avLst/>
+          </a:prstGeom>
+          <a:noFill/>
+          <a:ln w="12700">
+            <a:solidFill>
+              <a:prstClr val="black"/>
+            </a:solidFill>
+          </a:ln>
+        </p:spPr>
+        <p:txBody>
+          <a:bodyPr vert="horz" lIns="91440" tIns="45720" rIns="91440" bIns="45720" rtlCol="0" anchor="ctr"/>
+          <a:lstStyle/>
+          <a:p>
+            <a:endParaRPr lang="en-DK"/>
+          </a:p>
+        </p:txBody>
+      </p:sp>
+      <p:sp>
+        <p:nvSpPr>
+          <p:cNvPr id="5" name="Notes Placeholder 4"/>
+          <p:cNvSpPr>
+            <a:spLocks noGrp="1"/>
+          </p:cNvSpPr>
+          <p:nvPr>
+            <p:ph type="body" sz="quarter" idx="3"/>
+          </p:nvPr>
+        </p:nvSpPr>
+        <p:spPr>
+          <a:xfrm>
+            <a:off x="685800" y="4400550"/>
+            <a:ext cx="5486400" cy="3600450"/>
+          </a:xfrm>
+          <a:prstGeom prst="rect">
+            <a:avLst/>
+          </a:prstGeom>
+        </p:spPr>
+        <p:txBody>
+          <a:bodyPr vert="horz" lIns="91440" tIns="45720" rIns="91440" bIns="45720" rtlCol="0"/>
+          <a:lstStyle/>
+          <a:p>
+            <a:pPr lvl="0"/>
+            <a:r>
+              <a:rPr lang="en-US"/>
+              <a:t>Click to edit Master text styles</a:t>
+            </a:r>
+          </a:p>
+          <a:p>
+            <a:pPr lvl="1"/>
+            <a:r>
+              <a:rPr lang="en-US"/>
+              <a:t>Second level</a:t>
+            </a:r>
+          </a:p>
+          <a:p>
+            <a:pPr lvl="2"/>
+            <a:r>
+              <a:rPr lang="en-US"/>
+              <a:t>Third level</a:t>
+            </a:r>
+          </a:p>
+          <a:p>
+            <a:pPr lvl="3"/>
+            <a:r>
+              <a:rPr lang="en-US"/>
+              <a:t>Fourth level</a:t>
+            </a:r>
+          </a:p>
+          <a:p>
+            <a:pPr lvl="4"/>
+            <a:r>
+              <a:rPr lang="en-US"/>
+              <a:t>Fifth level</a:t>
+            </a:r>
+            <a:endParaRPr lang="en-DK"/>
+          </a:p>
+        </p:txBody>
+      </p:sp>
+      <p:sp>
+        <p:nvSpPr>
+          <p:cNvPr id="6" name="Footer Placeholder 5"/>
+          <p:cNvSpPr>
+            <a:spLocks noGrp="1"/>
+          </p:cNvSpPr>
+          <p:nvPr>
+            <p:ph type="ftr" sz="quarter" idx="4"/>
+          </p:nvPr>
+        </p:nvSpPr>
+        <p:spPr>
+          <a:xfrm>
+            <a:off x="0" y="8685213"/>
+            <a:ext cx="2971800" cy="458787"/>
+          </a:xfrm>
+          <a:prstGeom prst="rect">
+            <a:avLst/>
+          </a:prstGeom>
+        </p:spPr>
+        <p:txBody>
+          <a:bodyPr vert="horz" lIns="91440" tIns="45720" rIns="91440" bIns="45720" rtlCol="0" anchor="b"/>
+          <a:lstStyle>
+            <a:lvl1pPr algn="l">
+              <a:defRPr sz="1200"/>
+            </a:lvl1pPr>
+          </a:lstStyle>
+          <a:p>
+            <a:endParaRPr lang="en-DK"/>
+          </a:p>
+        </p:txBody>
+      </p:sp>
+      <p:sp>
+        <p:nvSpPr>
+          <p:cNvPr id="7" name="Slide Number Placeholder 6"/>
+          <p:cNvSpPr>
+            <a:spLocks noGrp="1"/>
+          </p:cNvSpPr>
+          <p:nvPr>
+            <p:ph type="sldNum" sz="quarter" idx="5"/>
+          </p:nvPr>
+        </p:nvSpPr>
+        <p:spPr>
+          <a:xfrm>
+            <a:off x="3884613" y="8685213"/>
+            <a:ext cx="2971800" cy="458787"/>
+          </a:xfrm>
+          <a:prstGeom prst="rect">
+            <a:avLst/>
+          </a:prstGeom>
+        </p:spPr>
+        <p:txBody>
+          <a:bodyPr vert="horz" lIns="91440" tIns="45720" rIns="91440" bIns="45720" rtlCol="0" anchor="b"/>
+          <a:lstStyle>
+            <a:lvl1pPr algn="r">
+              <a:defRPr sz="1200"/>
+            </a:lvl1pPr>
+          </a:lstStyle>
+          <a:p>
+            <a:fld id="{775FEB98-C841-46A9-BF37-7E96D1AF0BC7}" type="slidenum">
+              <a:rPr lang="en-DK" smtClean="0"/>
+              <a:t>‹#›</a:t>
+            </a:fld>
+            <a:endParaRPr lang="en-DK"/>
+          </a:p>
+        </p:txBody>
+      </p:sp>
+    </p:spTree>
+    <p:extLst>
+      <p:ext uri="{BB962C8B-B14F-4D97-AF65-F5344CB8AC3E}">
+        <p14:creationId xmlns:p14="http://schemas.microsoft.com/office/powerpoint/2010/main" val="3163001030"/>
+      </p:ext>
+    </p:extLst>
+  </p:cSld>
+  <p:clrMap bg1="lt1" tx1="dk1" bg2="lt2" tx2="dk2" accent1="accent1" accent2="accent2" accent3="accent3" accent4="accent4" accent5="accent5" accent6="accent6" hlink="hlink" folHlink="folHlink"/>
+  <p:notesStyle>
+    <a:lvl1pPr marL="0" algn="l" defTabSz="914400" rtl="0" eaLnBrk="1" latinLnBrk="0" hangingPunct="1">
+      <a:defRPr sz="1200" kern="1200">
+        <a:solidFill>
+          <a:schemeClr val="tx1"/>
+        </a:solidFill>
+        <a:latin typeface="+mn-lt"/>
+        <a:ea typeface="+mn-ea"/>
+        <a:cs typeface="+mn-cs"/>
+      </a:defRPr>
+    </a:lvl1pPr>
+    <a:lvl2pPr marL="457200" algn="l" defTabSz="914400" rtl="0" eaLnBrk="1" latinLnBrk="0" hangingPunct="1">
+      <a:defRPr sz="1200" kern="1200">
+        <a:solidFill>
+          <a:schemeClr val="tx1"/>
+        </a:solidFill>
+        <a:latin typeface="+mn-lt"/>
+        <a:ea typeface="+mn-ea"/>
+        <a:cs typeface="+mn-cs"/>
+      </a:defRPr>
+    </a:lvl2pPr>
+    <a:lvl3pPr marL="914400" algn="l" defTabSz="914400" rtl="0" eaLnBrk="1" latinLnBrk="0" hangingPunct="1">
+      <a:defRPr sz="1200" kern="1200">
+        <a:solidFill>
+          <a:schemeClr val="tx1"/>
+        </a:solidFill>
+        <a:latin typeface="+mn-lt"/>
+        <a:ea typeface="+mn-ea"/>
+        <a:cs typeface="+mn-cs"/>
+      </a:defRPr>
+    </a:lvl3pPr>
+    <a:lvl4pPr marL="1371600" algn="l" defTabSz="914400" rtl="0" eaLnBrk="1" latinLnBrk="0" hangingPunct="1">
+      <a:defRPr sz="1200" kern="1200">
+        <a:solidFill>
+          <a:schemeClr val="tx1"/>
+        </a:solidFill>
+        <a:latin typeface="+mn-lt"/>
+        <a:ea typeface="+mn-ea"/>
+        <a:cs typeface="+mn-cs"/>
+      </a:defRPr>
+    </a:lvl4pPr>
+    <a:lvl5pPr marL="1828800" algn="l" defTabSz="914400" rtl="0" eaLnBrk="1" latinLnBrk="0" hangingPunct="1">
+      <a:defRPr sz="1200" kern="1200">
+        <a:solidFill>
+          <a:schemeClr val="tx1"/>
+        </a:solidFill>
+        <a:latin typeface="+mn-lt"/>
+        <a:ea typeface="+mn-ea"/>
+        <a:cs typeface="+mn-cs"/>
+      </a:defRPr>
+    </a:lvl5pPr>
+    <a:lvl6pPr marL="2286000" algn="l" defTabSz="914400" rtl="0" eaLnBrk="1" latinLnBrk="0" hangingPunct="1">
+      <a:defRPr sz="1200" kern="1200">
+        <a:solidFill>
+          <a:schemeClr val="tx1"/>
+        </a:solidFill>
+        <a:latin typeface="+mn-lt"/>
+        <a:ea typeface="+mn-ea"/>
+        <a:cs typeface="+mn-cs"/>
+      </a:defRPr>
+    </a:lvl6pPr>
+    <a:lvl7pPr marL="2743200" algn="l" defTabSz="914400" rtl="0" eaLnBrk="1" latinLnBrk="0" hangingPunct="1">
+      <a:defRPr sz="1200" kern="1200">
+        <a:solidFill>
+          <a:schemeClr val="tx1"/>
+        </a:solidFill>
+        <a:latin typeface="+mn-lt"/>
+        <a:ea typeface="+mn-ea"/>
+        <a:cs typeface="+mn-cs"/>
+      </a:defRPr>
+    </a:lvl7pPr>
+    <a:lvl8pPr marL="3200400" algn="l" defTabSz="914400" rtl="0" eaLnBrk="1" latinLnBrk="0" hangingPunct="1">
+      <a:defRPr sz="1200" kern="1200">
+        <a:solidFill>
+          <a:schemeClr val="tx1"/>
+        </a:solidFill>
+        <a:latin typeface="+mn-lt"/>
+        <a:ea typeface="+mn-ea"/>
+        <a:cs typeface="+mn-cs"/>
+      </a:defRPr>
+    </a:lvl8pPr>
+    <a:lvl9pPr marL="3657600" algn="l" defTabSz="914400" rtl="0" eaLnBrk="1" latinLnBrk="0" hangingPunct="1">
+      <a:defRPr sz="1200" kern="1200">
+        <a:solidFill>
+          <a:schemeClr val="tx1"/>
+        </a:solidFill>
+        <a:latin typeface="+mn-lt"/>
+        <a:ea typeface="+mn-ea"/>
+        <a:cs typeface="+mn-cs"/>
+      </a:defRPr>
+    </a:lvl9pPr>
+  </p:notesStyle>
+</p:notesMaster>
+</file>
+
+<file path=ppt/notesSlides/notesSlide1.xml><?xml version="1.0" encoding="utf-8"?>
+<p:notes xmlns:a="http://schemas.openxmlformats.org/drawingml/2006/main" xmlns:r="http://schemas.openxmlformats.org/officeDocument/2006/relationships" xmlns:p="http://schemas.openxmlformats.org/presentationml/2006/main">
+  <p:cSld>
+    <p:spTree>
+      <p:nvGrpSpPr>
+        <p:cNvPr id="1" name=""/>
+        <p:cNvGrpSpPr/>
+        <p:nvPr/>
+      </p:nvGrpSpPr>
+      <p:grpSpPr>
+        <a:xfrm>
+          <a:off x="0" y="0"/>
+          <a:ext cx="0" cy="0"/>
+          <a:chOff x="0" y="0"/>
+          <a:chExt cx="0" cy="0"/>
+        </a:xfrm>
+      </p:grpSpPr>
+      <p:sp>
+        <p:nvSpPr>
+          <p:cNvPr id="2" name="Slide Image Placeholder 1"/>
+          <p:cNvSpPr>
+            <a:spLocks noGrp="1" noRot="1" noChangeAspect="1"/>
+          </p:cNvSpPr>
+          <p:nvPr>
+            <p:ph type="sldImg"/>
+          </p:nvPr>
+        </p:nvSpPr>
+        <p:spPr/>
+      </p:sp>
+      <p:sp>
+        <p:nvSpPr>
+          <p:cNvPr id="3" name="Notes Placeholder 2"/>
+          <p:cNvSpPr>
+            <a:spLocks noGrp="1"/>
+          </p:cNvSpPr>
+          <p:nvPr>
+            <p:ph type="body" idx="1"/>
+          </p:nvPr>
+        </p:nvSpPr>
+        <p:spPr/>
+        <p:txBody>
+          <a:bodyPr/>
+          <a:lstStyle/>
+          <a:p>
+            <a:r>
+              <a:rPr lang="en-GB" dirty="0"/>
+              <a:t>Experimental setup</a:t>
+            </a:r>
+            <a:endParaRPr lang="en-DK" dirty="0"/>
+          </a:p>
+        </p:txBody>
+      </p:sp>
+      <p:sp>
+        <p:nvSpPr>
+          <p:cNvPr id="4" name="Slide Number Placeholder 3"/>
+          <p:cNvSpPr>
+            <a:spLocks noGrp="1"/>
+          </p:cNvSpPr>
+          <p:nvPr>
+            <p:ph type="sldNum" sz="quarter" idx="5"/>
+          </p:nvPr>
+        </p:nvSpPr>
+        <p:spPr/>
+        <p:txBody>
+          <a:bodyPr/>
+          <a:lstStyle/>
+          <a:p>
+            <a:fld id="{775FEB98-C841-46A9-BF37-7E96D1AF0BC7}" type="slidenum">
+              <a:rPr lang="en-DK" smtClean="0"/>
+              <a:t>4</a:t>
+            </a:fld>
+            <a:endParaRPr lang="en-DK"/>
+          </a:p>
+        </p:txBody>
+      </p:sp>
+    </p:spTree>
+    <p:extLst>
+      <p:ext uri="{BB962C8B-B14F-4D97-AF65-F5344CB8AC3E}">
+        <p14:creationId xmlns:p14="http://schemas.microsoft.com/office/powerpoint/2010/main" val="1529407802"/>
+      </p:ext>
+    </p:extLst>
+  </p:cSld>
+  <p:clrMapOvr>
+    <a:masterClrMapping/>
+  </p:clrMapOvr>
+</p:notes>
+</file>
+
 <file path=ppt/slideLayouts/slideLayout1.xml><?xml version="1.0" encoding="utf-8"?>
 <p:sldLayout xmlns:a="http://schemas.openxmlformats.org/drawingml/2006/main" xmlns:r="http://schemas.openxmlformats.org/officeDocument/2006/relationships" xmlns:p="http://schemas.openxmlformats.org/presentationml/2006/main" type="title" preserve="1">
   <p:cSld name="Title Slide">
@@ -263,7 +707,7 @@
           <a:p>
             <a:fld id="{FC494E8C-FC75-41A8-A75A-6DCBE54C971A}" type="datetimeFigureOut">
               <a:rPr lang="en-DK" smtClean="0"/>
-              <a:t>19/04/2024</a:t>
+              <a:t>20/04/2024</a:t>
             </a:fld>
             <a:endParaRPr lang="en-DK"/>
           </a:p>
@@ -463,7 +907,7 @@
           <a:p>
             <a:fld id="{FC494E8C-FC75-41A8-A75A-6DCBE54C971A}" type="datetimeFigureOut">
               <a:rPr lang="en-DK" smtClean="0"/>
-              <a:t>19/04/2024</a:t>
+              <a:t>20/04/2024</a:t>
             </a:fld>
             <a:endParaRPr lang="en-DK"/>
           </a:p>
@@ -673,7 +1117,7 @@
           <a:p>
             <a:fld id="{FC494E8C-FC75-41A8-A75A-6DCBE54C971A}" type="datetimeFigureOut">
               <a:rPr lang="en-DK" smtClean="0"/>
-              <a:t>19/04/2024</a:t>
+              <a:t>20/04/2024</a:t>
             </a:fld>
             <a:endParaRPr lang="en-DK"/>
           </a:p>
@@ -873,7 +1317,7 @@
           <a:p>
             <a:fld id="{FC494E8C-FC75-41A8-A75A-6DCBE54C971A}" type="datetimeFigureOut">
               <a:rPr lang="en-DK" smtClean="0"/>
-              <a:t>19/04/2024</a:t>
+              <a:t>20/04/2024</a:t>
             </a:fld>
             <a:endParaRPr lang="en-DK"/>
           </a:p>
@@ -1149,7 +1593,7 @@
           <a:p>
             <a:fld id="{FC494E8C-FC75-41A8-A75A-6DCBE54C971A}" type="datetimeFigureOut">
               <a:rPr lang="en-DK" smtClean="0"/>
-              <a:t>19/04/2024</a:t>
+              <a:t>20/04/2024</a:t>
             </a:fld>
             <a:endParaRPr lang="en-DK"/>
           </a:p>
@@ -1417,7 +1861,7 @@
           <a:p>
             <a:fld id="{FC494E8C-FC75-41A8-A75A-6DCBE54C971A}" type="datetimeFigureOut">
               <a:rPr lang="en-DK" smtClean="0"/>
-              <a:t>19/04/2024</a:t>
+              <a:t>20/04/2024</a:t>
             </a:fld>
             <a:endParaRPr lang="en-DK"/>
           </a:p>
@@ -1832,7 +2276,7 @@
           <a:p>
             <a:fld id="{FC494E8C-FC75-41A8-A75A-6DCBE54C971A}" type="datetimeFigureOut">
               <a:rPr lang="en-DK" smtClean="0"/>
-              <a:t>19/04/2024</a:t>
+              <a:t>20/04/2024</a:t>
             </a:fld>
             <a:endParaRPr lang="en-DK"/>
           </a:p>
@@ -1974,7 +2418,7 @@
           <a:p>
             <a:fld id="{FC494E8C-FC75-41A8-A75A-6DCBE54C971A}" type="datetimeFigureOut">
               <a:rPr lang="en-DK" smtClean="0"/>
-              <a:t>19/04/2024</a:t>
+              <a:t>20/04/2024</a:t>
             </a:fld>
             <a:endParaRPr lang="en-DK"/>
           </a:p>
@@ -2087,7 +2531,7 @@
           <a:p>
             <a:fld id="{FC494E8C-FC75-41A8-A75A-6DCBE54C971A}" type="datetimeFigureOut">
               <a:rPr lang="en-DK" smtClean="0"/>
-              <a:t>19/04/2024</a:t>
+              <a:t>20/04/2024</a:t>
             </a:fld>
             <a:endParaRPr lang="en-DK"/>
           </a:p>
@@ -2400,7 +2844,7 @@
           <a:p>
             <a:fld id="{FC494E8C-FC75-41A8-A75A-6DCBE54C971A}" type="datetimeFigureOut">
               <a:rPr lang="en-DK" smtClean="0"/>
-              <a:t>19/04/2024</a:t>
+              <a:t>20/04/2024</a:t>
             </a:fld>
             <a:endParaRPr lang="en-DK"/>
           </a:p>
@@ -2689,7 +3133,7 @@
           <a:p>
             <a:fld id="{FC494E8C-FC75-41A8-A75A-6DCBE54C971A}" type="datetimeFigureOut">
               <a:rPr lang="en-DK" smtClean="0"/>
-              <a:t>19/04/2024</a:t>
+              <a:t>20/04/2024</a:t>
             </a:fld>
             <a:endParaRPr lang="en-DK"/>
           </a:p>
@@ -2932,7 +3376,7 @@
           <a:p>
             <a:fld id="{FC494E8C-FC75-41A8-A75A-6DCBE54C971A}" type="datetimeFigureOut">
               <a:rPr lang="en-DK" smtClean="0"/>
-              <a:t>19/04/2024</a:t>
+              <a:t>20/04/2024</a:t>
             </a:fld>
             <a:endParaRPr lang="en-DK"/>
           </a:p>
@@ -4085,6 +4529,1724 @@
     <p:extLst>
       <p:ext uri="{BB962C8B-B14F-4D97-AF65-F5344CB8AC3E}">
         <p14:creationId xmlns:p14="http://schemas.microsoft.com/office/powerpoint/2010/main" val="4090651676"/>
+      </p:ext>
+    </p:extLst>
+  </p:cSld>
+  <p:clrMapOvr>
+    <a:masterClrMapping/>
+  </p:clrMapOvr>
+</p:sld>
+</file>
+
+<file path=ppt/slides/slide4.xml><?xml version="1.0" encoding="utf-8"?>
+<p:sld xmlns:a="http://schemas.openxmlformats.org/drawingml/2006/main" xmlns:r="http://schemas.openxmlformats.org/officeDocument/2006/relationships" xmlns:p="http://schemas.openxmlformats.org/presentationml/2006/main">
+  <p:cSld>
+    <p:spTree>
+      <p:nvGrpSpPr>
+        <p:cNvPr id="1" name=""/>
+        <p:cNvGrpSpPr/>
+        <p:nvPr/>
+      </p:nvGrpSpPr>
+      <p:grpSpPr>
+        <a:xfrm>
+          <a:off x="0" y="0"/>
+          <a:ext cx="0" cy="0"/>
+          <a:chOff x="0" y="0"/>
+          <a:chExt cx="0" cy="0"/>
+        </a:xfrm>
+      </p:grpSpPr>
+      <p:pic>
+        <p:nvPicPr>
+          <p:cNvPr id="1026" name="Picture 2" descr="Hero Image">
+            <a:extLst>
+              <a:ext uri="{FF2B5EF4-FFF2-40B4-BE49-F238E27FC236}">
+                <a16:creationId xmlns:a16="http://schemas.microsoft.com/office/drawing/2014/main" id="{B70DCF4B-BE0C-E7E6-4965-05ACFBF7514F}"/>
+              </a:ext>
+            </a:extLst>
+          </p:cNvPr>
+          <p:cNvPicPr>
+            <a:picLocks noChangeAspect="1" noChangeArrowheads="1"/>
+          </p:cNvPicPr>
+          <p:nvPr/>
+        </p:nvPicPr>
+        <p:blipFill>
+          <a:blip r:embed="rId3">
+            <a:extLst>
+              <a:ext uri="{28A0092B-C50C-407E-A947-70E740481C1C}">
+                <a14:useLocalDpi xmlns:a14="http://schemas.microsoft.com/office/drawing/2010/main" val="0"/>
+              </a:ext>
+            </a:extLst>
+          </a:blip>
+          <a:srcRect/>
+          <a:stretch>
+            <a:fillRect/>
+          </a:stretch>
+        </p:blipFill>
+        <p:spPr bwMode="auto">
+          <a:xfrm>
+            <a:off x="5222374" y="4019021"/>
+            <a:ext cx="2219908" cy="1109954"/>
+          </a:xfrm>
+          <a:prstGeom prst="rect">
+            <a:avLst/>
+          </a:prstGeom>
+          <a:noFill/>
+          <a:extLst>
+            <a:ext uri="{909E8E84-426E-40DD-AFC4-6F175D3DCCD1}">
+              <a14:hiddenFill xmlns:a14="http://schemas.microsoft.com/office/drawing/2010/main">
+                <a:solidFill>
+                  <a:srgbClr val="FFFFFF"/>
+                </a:solidFill>
+              </a14:hiddenFill>
+            </a:ext>
+          </a:extLst>
+        </p:spPr>
+      </p:pic>
+      <p:pic>
+        <p:nvPicPr>
+          <p:cNvPr id="1028" name="Picture 4" descr="Hero Image">
+            <a:extLst>
+              <a:ext uri="{FF2B5EF4-FFF2-40B4-BE49-F238E27FC236}">
+                <a16:creationId xmlns:a16="http://schemas.microsoft.com/office/drawing/2014/main" id="{9603B287-90E0-DF4B-039F-B00E1AE99C6F}"/>
+              </a:ext>
+            </a:extLst>
+          </p:cNvPr>
+          <p:cNvPicPr>
+            <a:picLocks noChangeAspect="1" noChangeArrowheads="1"/>
+          </p:cNvPicPr>
+          <p:nvPr/>
+        </p:nvPicPr>
+        <p:blipFill>
+          <a:blip r:embed="rId4">
+            <a:extLst>
+              <a:ext uri="{28A0092B-C50C-407E-A947-70E740481C1C}">
+                <a14:useLocalDpi xmlns:a14="http://schemas.microsoft.com/office/drawing/2010/main" val="0"/>
+              </a:ext>
+            </a:extLst>
+          </a:blip>
+          <a:srcRect/>
+          <a:stretch>
+            <a:fillRect/>
+          </a:stretch>
+        </p:blipFill>
+        <p:spPr bwMode="auto">
+          <a:xfrm>
+            <a:off x="8388999" y="4112133"/>
+            <a:ext cx="1847461" cy="923731"/>
+          </a:xfrm>
+          <a:prstGeom prst="rect">
+            <a:avLst/>
+          </a:prstGeom>
+          <a:noFill/>
+          <a:extLst>
+            <a:ext uri="{909E8E84-426E-40DD-AFC4-6F175D3DCCD1}">
+              <a14:hiddenFill xmlns:a14="http://schemas.microsoft.com/office/drawing/2010/main">
+                <a:solidFill>
+                  <a:srgbClr val="FFFFFF"/>
+                </a:solidFill>
+              </a14:hiddenFill>
+            </a:ext>
+          </a:extLst>
+        </p:spPr>
+      </p:pic>
+      <p:pic>
+        <p:nvPicPr>
+          <p:cNvPr id="5" name="Picture 4" descr="A black and red bar&#10;&#10;Description automatically generated">
+            <a:extLst>
+              <a:ext uri="{FF2B5EF4-FFF2-40B4-BE49-F238E27FC236}">
+                <a16:creationId xmlns:a16="http://schemas.microsoft.com/office/drawing/2014/main" id="{3EA89719-1756-781C-93B3-FF228BFBCAFE}"/>
+              </a:ext>
+            </a:extLst>
+          </p:cNvPr>
+          <p:cNvPicPr>
+            <a:picLocks noChangeAspect="1"/>
+          </p:cNvPicPr>
+          <p:nvPr/>
+        </p:nvPicPr>
+        <p:blipFill rotWithShape="1">
+          <a:blip r:embed="rId5">
+            <a:extLst>
+              <a:ext uri="{28A0092B-C50C-407E-A947-70E740481C1C}">
+                <a14:useLocalDpi xmlns:a14="http://schemas.microsoft.com/office/drawing/2010/main" val="0"/>
+              </a:ext>
+            </a:extLst>
+          </a:blip>
+          <a:srcRect l="31198" t="49153" r="31530" b="39402"/>
+          <a:stretch/>
+        </p:blipFill>
+        <p:spPr>
+          <a:xfrm>
+            <a:off x="7915641" y="2248211"/>
+            <a:ext cx="2052734" cy="354563"/>
+          </a:xfrm>
+          <a:prstGeom prst="rect">
+            <a:avLst/>
+          </a:prstGeom>
+        </p:spPr>
+      </p:pic>
+      <p:sp>
+        <p:nvSpPr>
+          <p:cNvPr id="6" name="Rectangle 5">
+            <a:extLst>
+              <a:ext uri="{FF2B5EF4-FFF2-40B4-BE49-F238E27FC236}">
+                <a16:creationId xmlns:a16="http://schemas.microsoft.com/office/drawing/2014/main" id="{F876F96D-325C-7C1B-E89F-418512E05C75}"/>
+              </a:ext>
+            </a:extLst>
+          </p:cNvPr>
+          <p:cNvSpPr/>
+          <p:nvPr/>
+        </p:nvSpPr>
+        <p:spPr>
+          <a:xfrm>
+            <a:off x="7812149" y="1683708"/>
+            <a:ext cx="2323322" cy="1483568"/>
+          </a:xfrm>
+          <a:prstGeom prst="rect">
+            <a:avLst/>
+          </a:prstGeom>
+          <a:noFill/>
+          <a:ln>
+            <a:solidFill>
+              <a:schemeClr val="tx1"/>
+            </a:solidFill>
+          </a:ln>
+        </p:spPr>
+        <p:style>
+          <a:lnRef idx="2">
+            <a:schemeClr val="accent1">
+              <a:shade val="15000"/>
+            </a:schemeClr>
+          </a:lnRef>
+          <a:fillRef idx="1">
+            <a:schemeClr val="accent1"/>
+          </a:fillRef>
+          <a:effectRef idx="0">
+            <a:schemeClr val="accent1"/>
+          </a:effectRef>
+          <a:fontRef idx="minor">
+            <a:schemeClr val="lt1"/>
+          </a:fontRef>
+        </p:style>
+        <p:txBody>
+          <a:bodyPr rtlCol="0" anchor="ctr"/>
+          <a:lstStyle/>
+          <a:p>
+            <a:pPr algn="ctr"/>
+            <a:endParaRPr lang="en-DK"/>
+          </a:p>
+        </p:txBody>
+      </p:sp>
+      <p:pic>
+        <p:nvPicPr>
+          <p:cNvPr id="8" name="Picture 7" descr="A screenshot of a computer&#10;&#10;Description automatically generated">
+            <a:extLst>
+              <a:ext uri="{FF2B5EF4-FFF2-40B4-BE49-F238E27FC236}">
+                <a16:creationId xmlns:a16="http://schemas.microsoft.com/office/drawing/2014/main" id="{0DFB4566-AAF8-10AB-ACD6-296C5BCFA70A}"/>
+              </a:ext>
+            </a:extLst>
+          </p:cNvPr>
+          <p:cNvPicPr>
+            <a:picLocks noChangeAspect="1"/>
+          </p:cNvPicPr>
+          <p:nvPr/>
+        </p:nvPicPr>
+        <p:blipFill>
+          <a:blip r:embed="rId6">
+            <a:extLst>
+              <a:ext uri="{28A0092B-C50C-407E-A947-70E740481C1C}">
+                <a14:useLocalDpi xmlns:a14="http://schemas.microsoft.com/office/drawing/2010/main" val="0"/>
+              </a:ext>
+            </a:extLst>
+          </a:blip>
+          <a:stretch>
+            <a:fillRect/>
+          </a:stretch>
+        </p:blipFill>
+        <p:spPr>
+          <a:xfrm>
+            <a:off x="1919856" y="1280160"/>
+            <a:ext cx="2811646" cy="2290665"/>
+          </a:xfrm>
+          <a:prstGeom prst="rect">
+            <a:avLst/>
+          </a:prstGeom>
+        </p:spPr>
+      </p:pic>
+      <p:cxnSp>
+        <p:nvCxnSpPr>
+          <p:cNvPr id="10" name="Connector: Elbow 9">
+            <a:extLst>
+              <a:ext uri="{FF2B5EF4-FFF2-40B4-BE49-F238E27FC236}">
+                <a16:creationId xmlns:a16="http://schemas.microsoft.com/office/drawing/2014/main" id="{10198F53-6BEC-CF48-95CB-FAAEDE2BEDDF}"/>
+              </a:ext>
+            </a:extLst>
+          </p:cNvPr>
+          <p:cNvCxnSpPr/>
+          <p:nvPr/>
+        </p:nvCxnSpPr>
+        <p:spPr>
+          <a:xfrm rot="10800000">
+            <a:off x="7442283" y="4573998"/>
+            <a:ext cx="946717" cy="1"/>
+          </a:xfrm>
+          <a:prstGeom prst="bentConnector3">
+            <a:avLst/>
+          </a:prstGeom>
+          <a:ln w="38100">
+            <a:solidFill>
+              <a:schemeClr val="tx1"/>
+            </a:solidFill>
+            <a:tailEnd type="triangle"/>
+          </a:ln>
+        </p:spPr>
+        <p:style>
+          <a:lnRef idx="2">
+            <a:schemeClr val="accent1"/>
+          </a:lnRef>
+          <a:fillRef idx="0">
+            <a:schemeClr val="accent1"/>
+          </a:fillRef>
+          <a:effectRef idx="1">
+            <a:schemeClr val="accent1"/>
+          </a:effectRef>
+          <a:fontRef idx="minor">
+            <a:schemeClr val="tx1"/>
+          </a:fontRef>
+        </p:style>
+      </p:cxnSp>
+      <p:cxnSp>
+        <p:nvCxnSpPr>
+          <p:cNvPr id="11" name="Connector: Elbow 10">
+            <a:extLst>
+              <a:ext uri="{FF2B5EF4-FFF2-40B4-BE49-F238E27FC236}">
+                <a16:creationId xmlns:a16="http://schemas.microsoft.com/office/drawing/2014/main" id="{9B0FDAF1-EE28-58A6-1787-A5C38FABC344}"/>
+              </a:ext>
+            </a:extLst>
+          </p:cNvPr>
+          <p:cNvCxnSpPr>
+            <a:cxnSpLocks/>
+          </p:cNvCxnSpPr>
+          <p:nvPr/>
+        </p:nvCxnSpPr>
+        <p:spPr>
+          <a:xfrm flipV="1">
+            <a:off x="4731502" y="2424886"/>
+            <a:ext cx="3080647" cy="1"/>
+          </a:xfrm>
+          <a:prstGeom prst="bentConnector3">
+            <a:avLst/>
+          </a:prstGeom>
+          <a:ln w="38100">
+            <a:solidFill>
+              <a:schemeClr val="tx1"/>
+            </a:solidFill>
+            <a:tailEnd type="triangle"/>
+          </a:ln>
+        </p:spPr>
+        <p:style>
+          <a:lnRef idx="2">
+            <a:schemeClr val="accent1"/>
+          </a:lnRef>
+          <a:fillRef idx="0">
+            <a:schemeClr val="accent1"/>
+          </a:fillRef>
+          <a:effectRef idx="1">
+            <a:schemeClr val="accent1"/>
+          </a:effectRef>
+          <a:fontRef idx="minor">
+            <a:schemeClr val="tx1"/>
+          </a:fontRef>
+        </p:style>
+      </p:cxnSp>
+      <p:cxnSp>
+        <p:nvCxnSpPr>
+          <p:cNvPr id="14" name="Connector: Elbow 13">
+            <a:extLst>
+              <a:ext uri="{FF2B5EF4-FFF2-40B4-BE49-F238E27FC236}">
+                <a16:creationId xmlns:a16="http://schemas.microsoft.com/office/drawing/2014/main" id="{DFFA7BC6-F650-3610-82C6-39F185249834}"/>
+              </a:ext>
+            </a:extLst>
+          </p:cNvPr>
+          <p:cNvCxnSpPr>
+            <a:cxnSpLocks/>
+            <a:stCxn id="1026" idx="1"/>
+            <a:endCxn id="8" idx="2"/>
+          </p:cNvCxnSpPr>
+          <p:nvPr/>
+        </p:nvCxnSpPr>
+        <p:spPr>
+          <a:xfrm rot="10800000">
+            <a:off x="3325680" y="3570826"/>
+            <a:ext cx="1896695" cy="1003173"/>
+          </a:xfrm>
+          <a:prstGeom prst="bentConnector2">
+            <a:avLst/>
+          </a:prstGeom>
+          <a:ln w="38100">
+            <a:solidFill>
+              <a:schemeClr val="tx1"/>
+            </a:solidFill>
+            <a:tailEnd type="triangle"/>
+          </a:ln>
+        </p:spPr>
+        <p:style>
+          <a:lnRef idx="2">
+            <a:schemeClr val="accent1"/>
+          </a:lnRef>
+          <a:fillRef idx="0">
+            <a:schemeClr val="accent1"/>
+          </a:fillRef>
+          <a:effectRef idx="1">
+            <a:schemeClr val="accent1"/>
+          </a:effectRef>
+          <a:fontRef idx="minor">
+            <a:schemeClr val="tx1"/>
+          </a:fontRef>
+        </p:style>
+      </p:cxnSp>
+      <p:sp>
+        <p:nvSpPr>
+          <p:cNvPr id="17" name="TextBox 16">
+            <a:extLst>
+              <a:ext uri="{FF2B5EF4-FFF2-40B4-BE49-F238E27FC236}">
+                <a16:creationId xmlns:a16="http://schemas.microsoft.com/office/drawing/2014/main" id="{957A6456-4852-8928-1DCE-25C506A1A8F1}"/>
+              </a:ext>
+            </a:extLst>
+          </p:cNvPr>
+          <p:cNvSpPr txBox="1"/>
+          <p:nvPr/>
+        </p:nvSpPr>
+        <p:spPr>
+          <a:xfrm>
+            <a:off x="1919856" y="910827"/>
+            <a:ext cx="1192571" cy="369332"/>
+          </a:xfrm>
+          <a:prstGeom prst="rect">
+            <a:avLst/>
+          </a:prstGeom>
+          <a:noFill/>
+        </p:spPr>
+        <p:txBody>
+          <a:bodyPr wrap="none" rtlCol="0">
+            <a:spAutoFit/>
+          </a:bodyPr>
+          <a:lstStyle/>
+          <a:p>
+            <a:r>
+              <a:rPr lang="en-GB" dirty="0"/>
+              <a:t>LabBench</a:t>
+            </a:r>
+            <a:endParaRPr lang="en-DK" dirty="0"/>
+          </a:p>
+        </p:txBody>
+      </p:sp>
+      <p:sp>
+        <p:nvSpPr>
+          <p:cNvPr id="18" name="TextBox 17">
+            <a:extLst>
+              <a:ext uri="{FF2B5EF4-FFF2-40B4-BE49-F238E27FC236}">
+                <a16:creationId xmlns:a16="http://schemas.microsoft.com/office/drawing/2014/main" id="{68EC2B76-050B-6EC1-B3BA-80C55FEB80E6}"/>
+              </a:ext>
+            </a:extLst>
+          </p:cNvPr>
+          <p:cNvSpPr txBox="1"/>
+          <p:nvPr/>
+        </p:nvSpPr>
+        <p:spPr>
+          <a:xfrm>
+            <a:off x="7725472" y="1323624"/>
+            <a:ext cx="1980992" cy="369332"/>
+          </a:xfrm>
+          <a:prstGeom prst="rect">
+            <a:avLst/>
+          </a:prstGeom>
+          <a:noFill/>
+        </p:spPr>
+        <p:txBody>
+          <a:bodyPr wrap="none" rtlCol="0">
+            <a:spAutoFit/>
+          </a:bodyPr>
+          <a:lstStyle/>
+          <a:p>
+            <a:r>
+              <a:rPr lang="en-GB" dirty="0"/>
+              <a:t>LabBench Display</a:t>
+            </a:r>
+            <a:endParaRPr lang="en-DK" dirty="0"/>
+          </a:p>
+        </p:txBody>
+      </p:sp>
+      <p:sp>
+        <p:nvSpPr>
+          <p:cNvPr id="19" name="TextBox 18">
+            <a:extLst>
+              <a:ext uri="{FF2B5EF4-FFF2-40B4-BE49-F238E27FC236}">
+                <a16:creationId xmlns:a16="http://schemas.microsoft.com/office/drawing/2014/main" id="{AFDE52B1-2E9C-EAFB-CFA7-927EE8E98D1C}"/>
+              </a:ext>
+            </a:extLst>
+          </p:cNvPr>
+          <p:cNvSpPr txBox="1"/>
+          <p:nvPr/>
+        </p:nvSpPr>
+        <p:spPr>
+          <a:xfrm>
+            <a:off x="8388999" y="3685971"/>
+            <a:ext cx="1907766" cy="369332"/>
+          </a:xfrm>
+          <a:prstGeom prst="rect">
+            <a:avLst/>
+          </a:prstGeom>
+          <a:noFill/>
+        </p:spPr>
+        <p:txBody>
+          <a:bodyPr wrap="none" rtlCol="0">
+            <a:spAutoFit/>
+          </a:bodyPr>
+          <a:lstStyle/>
+          <a:p>
+            <a:r>
+              <a:rPr lang="en-GB" dirty="0"/>
+              <a:t>LabBench SCALE</a:t>
+            </a:r>
+            <a:endParaRPr lang="en-DK" dirty="0"/>
+          </a:p>
+        </p:txBody>
+      </p:sp>
+      <p:sp>
+        <p:nvSpPr>
+          <p:cNvPr id="20" name="TextBox 19">
+            <a:extLst>
+              <a:ext uri="{FF2B5EF4-FFF2-40B4-BE49-F238E27FC236}">
+                <a16:creationId xmlns:a16="http://schemas.microsoft.com/office/drawing/2014/main" id="{ED9837F3-4A43-87CC-55C2-124E87EDB569}"/>
+              </a:ext>
+            </a:extLst>
+          </p:cNvPr>
+          <p:cNvSpPr txBox="1"/>
+          <p:nvPr/>
+        </p:nvSpPr>
+        <p:spPr>
+          <a:xfrm>
+            <a:off x="5215209" y="3685971"/>
+            <a:ext cx="1543564" cy="369332"/>
+          </a:xfrm>
+          <a:prstGeom prst="rect">
+            <a:avLst/>
+          </a:prstGeom>
+          <a:noFill/>
+        </p:spPr>
+        <p:txBody>
+          <a:bodyPr wrap="none" rtlCol="0">
+            <a:spAutoFit/>
+          </a:bodyPr>
+          <a:lstStyle/>
+          <a:p>
+            <a:r>
+              <a:rPr lang="en-GB" dirty="0"/>
+              <a:t>LabBench I/O</a:t>
+            </a:r>
+            <a:endParaRPr lang="en-DK" dirty="0"/>
+          </a:p>
+        </p:txBody>
+      </p:sp>
+    </p:spTree>
+    <p:extLst>
+      <p:ext uri="{BB962C8B-B14F-4D97-AF65-F5344CB8AC3E}">
+        <p14:creationId xmlns:p14="http://schemas.microsoft.com/office/powerpoint/2010/main" val="4225921912"/>
+      </p:ext>
+    </p:extLst>
+  </p:cSld>
+  <p:clrMapOvr>
+    <a:masterClrMapping/>
+  </p:clrMapOvr>
+</p:sld>
+</file>
+
+<file path=ppt/slides/slide5.xml><?xml version="1.0" encoding="utf-8"?>
+<p:sld xmlns:a="http://schemas.openxmlformats.org/drawingml/2006/main" xmlns:r="http://schemas.openxmlformats.org/officeDocument/2006/relationships" xmlns:p="http://schemas.openxmlformats.org/presentationml/2006/main">
+  <p:cSld>
+    <p:spTree>
+      <p:nvGrpSpPr>
+        <p:cNvPr id="1" name=""/>
+        <p:cNvGrpSpPr/>
+        <p:nvPr/>
+      </p:nvGrpSpPr>
+      <p:grpSpPr>
+        <a:xfrm>
+          <a:off x="0" y="0"/>
+          <a:ext cx="0" cy="0"/>
+          <a:chOff x="0" y="0"/>
+          <a:chExt cx="0" cy="0"/>
+        </a:xfrm>
+      </p:grpSpPr>
+      <p:pic>
+        <p:nvPicPr>
+          <p:cNvPr id="3" name="Picture 2">
+            <a:extLst>
+              <a:ext uri="{FF2B5EF4-FFF2-40B4-BE49-F238E27FC236}">
+                <a16:creationId xmlns:a16="http://schemas.microsoft.com/office/drawing/2014/main" id="{735145A2-94AD-52A9-ED7C-3E56AB80D00D}"/>
+              </a:ext>
+            </a:extLst>
+          </p:cNvPr>
+          <p:cNvPicPr>
+            <a:picLocks noChangeAspect="1"/>
+          </p:cNvPicPr>
+          <p:nvPr/>
+        </p:nvPicPr>
+        <p:blipFill>
+          <a:blip r:embed="rId2"/>
+          <a:stretch>
+            <a:fillRect/>
+          </a:stretch>
+        </p:blipFill>
+        <p:spPr>
+          <a:xfrm>
+            <a:off x="2158144" y="1457378"/>
+            <a:ext cx="7875712" cy="3943243"/>
+          </a:xfrm>
+          <a:prstGeom prst="rect">
+            <a:avLst/>
+          </a:prstGeom>
+        </p:spPr>
+      </p:pic>
+      <p:sp>
+        <p:nvSpPr>
+          <p:cNvPr id="4" name="TextBox 3">
+            <a:extLst>
+              <a:ext uri="{FF2B5EF4-FFF2-40B4-BE49-F238E27FC236}">
+                <a16:creationId xmlns:a16="http://schemas.microsoft.com/office/drawing/2014/main" id="{10A51301-BB34-8CB8-10BC-54F56C51015E}"/>
+              </a:ext>
+            </a:extLst>
+          </p:cNvPr>
+          <p:cNvSpPr txBox="1"/>
+          <p:nvPr/>
+        </p:nvSpPr>
+        <p:spPr>
+          <a:xfrm>
+            <a:off x="111595" y="5589036"/>
+            <a:ext cx="3009991" cy="369332"/>
+          </a:xfrm>
+          <a:prstGeom prst="rect">
+            <a:avLst/>
+          </a:prstGeom>
+          <a:noFill/>
+        </p:spPr>
+        <p:txBody>
+          <a:bodyPr wrap="none" rtlCol="0">
+            <a:spAutoFit/>
+          </a:bodyPr>
+          <a:lstStyle/>
+          <a:p>
+            <a:r>
+              <a:rPr lang="en-GB" dirty="0"/>
+              <a:t>1. Select the Protocols page.</a:t>
+            </a:r>
+            <a:endParaRPr lang="en-DK" dirty="0"/>
+          </a:p>
+        </p:txBody>
+      </p:sp>
+      <p:sp>
+        <p:nvSpPr>
+          <p:cNvPr id="5" name="TextBox 4">
+            <a:extLst>
+              <a:ext uri="{FF2B5EF4-FFF2-40B4-BE49-F238E27FC236}">
+                <a16:creationId xmlns:a16="http://schemas.microsoft.com/office/drawing/2014/main" id="{5F1CD402-1D2E-FBFE-0456-888020D032DE}"/>
+              </a:ext>
+            </a:extLst>
+          </p:cNvPr>
+          <p:cNvSpPr txBox="1"/>
+          <p:nvPr/>
+        </p:nvSpPr>
+        <p:spPr>
+          <a:xfrm>
+            <a:off x="642519" y="844050"/>
+            <a:ext cx="2825966" cy="369332"/>
+          </a:xfrm>
+          <a:prstGeom prst="rect">
+            <a:avLst/>
+          </a:prstGeom>
+          <a:noFill/>
+        </p:spPr>
+        <p:txBody>
+          <a:bodyPr wrap="none" rtlCol="0">
+            <a:spAutoFit/>
+          </a:bodyPr>
+          <a:lstStyle/>
+          <a:p>
+            <a:r>
+              <a:rPr lang="en-GB" dirty="0"/>
+              <a:t>2. Select the LabBench I/O</a:t>
+            </a:r>
+            <a:endParaRPr lang="en-DK" dirty="0"/>
+          </a:p>
+        </p:txBody>
+      </p:sp>
+      <p:sp>
+        <p:nvSpPr>
+          <p:cNvPr id="6" name="Rectangle 5">
+            <a:extLst>
+              <a:ext uri="{FF2B5EF4-FFF2-40B4-BE49-F238E27FC236}">
+                <a16:creationId xmlns:a16="http://schemas.microsoft.com/office/drawing/2014/main" id="{7993E9B1-0D7A-B910-3629-9C7DDE282B71}"/>
+              </a:ext>
+            </a:extLst>
+          </p:cNvPr>
+          <p:cNvSpPr/>
+          <p:nvPr/>
+        </p:nvSpPr>
+        <p:spPr>
+          <a:xfrm>
+            <a:off x="2158144" y="2179818"/>
+            <a:ext cx="594200" cy="517662"/>
+          </a:xfrm>
+          <a:prstGeom prst="rect">
+            <a:avLst/>
+          </a:prstGeom>
+          <a:noFill/>
+          <a:ln>
+            <a:solidFill>
+              <a:srgbClr val="FF0000"/>
+            </a:solidFill>
+          </a:ln>
+        </p:spPr>
+        <p:style>
+          <a:lnRef idx="2">
+            <a:schemeClr val="accent1">
+              <a:shade val="15000"/>
+            </a:schemeClr>
+          </a:lnRef>
+          <a:fillRef idx="1">
+            <a:schemeClr val="accent1"/>
+          </a:fillRef>
+          <a:effectRef idx="0">
+            <a:schemeClr val="accent1"/>
+          </a:effectRef>
+          <a:fontRef idx="minor">
+            <a:schemeClr val="lt1"/>
+          </a:fontRef>
+        </p:style>
+        <p:txBody>
+          <a:bodyPr rtlCol="0" anchor="ctr"/>
+          <a:lstStyle/>
+          <a:p>
+            <a:pPr algn="ctr"/>
+            <a:endParaRPr lang="en-DK"/>
+          </a:p>
+        </p:txBody>
+      </p:sp>
+      <p:sp>
+        <p:nvSpPr>
+          <p:cNvPr id="7" name="Rectangle 6">
+            <a:extLst>
+              <a:ext uri="{FF2B5EF4-FFF2-40B4-BE49-F238E27FC236}">
+                <a16:creationId xmlns:a16="http://schemas.microsoft.com/office/drawing/2014/main" id="{3A6E59B0-0496-7393-CC9D-7224A1B2D23E}"/>
+              </a:ext>
+            </a:extLst>
+          </p:cNvPr>
+          <p:cNvSpPr/>
+          <p:nvPr/>
+        </p:nvSpPr>
+        <p:spPr>
+          <a:xfrm>
+            <a:off x="2779776" y="1945370"/>
+            <a:ext cx="3511296" cy="688101"/>
+          </a:xfrm>
+          <a:prstGeom prst="rect">
+            <a:avLst/>
+          </a:prstGeom>
+          <a:noFill/>
+          <a:ln>
+            <a:solidFill>
+              <a:srgbClr val="FF0000"/>
+            </a:solidFill>
+          </a:ln>
+        </p:spPr>
+        <p:style>
+          <a:lnRef idx="2">
+            <a:schemeClr val="accent1">
+              <a:shade val="15000"/>
+            </a:schemeClr>
+          </a:lnRef>
+          <a:fillRef idx="1">
+            <a:schemeClr val="accent1"/>
+          </a:fillRef>
+          <a:effectRef idx="0">
+            <a:schemeClr val="accent1"/>
+          </a:effectRef>
+          <a:fontRef idx="minor">
+            <a:schemeClr val="lt1"/>
+          </a:fontRef>
+        </p:style>
+        <p:txBody>
+          <a:bodyPr rtlCol="0" anchor="ctr"/>
+          <a:lstStyle/>
+          <a:p>
+            <a:pPr algn="ctr"/>
+            <a:endParaRPr lang="en-DK"/>
+          </a:p>
+        </p:txBody>
+      </p:sp>
+      <p:sp>
+        <p:nvSpPr>
+          <p:cNvPr id="8" name="Rectangle 7">
+            <a:extLst>
+              <a:ext uri="{FF2B5EF4-FFF2-40B4-BE49-F238E27FC236}">
+                <a16:creationId xmlns:a16="http://schemas.microsoft.com/office/drawing/2014/main" id="{D771CAF7-8B93-594D-1A83-A675BD9BC72E}"/>
+              </a:ext>
+            </a:extLst>
+          </p:cNvPr>
+          <p:cNvSpPr/>
+          <p:nvPr/>
+        </p:nvSpPr>
+        <p:spPr>
+          <a:xfrm>
+            <a:off x="6504351" y="2078921"/>
+            <a:ext cx="3435177" cy="298519"/>
+          </a:xfrm>
+          <a:prstGeom prst="rect">
+            <a:avLst/>
+          </a:prstGeom>
+          <a:noFill/>
+          <a:ln>
+            <a:solidFill>
+              <a:srgbClr val="FF0000"/>
+            </a:solidFill>
+          </a:ln>
+        </p:spPr>
+        <p:style>
+          <a:lnRef idx="2">
+            <a:schemeClr val="accent1">
+              <a:shade val="15000"/>
+            </a:schemeClr>
+          </a:lnRef>
+          <a:fillRef idx="1">
+            <a:schemeClr val="accent1"/>
+          </a:fillRef>
+          <a:effectRef idx="0">
+            <a:schemeClr val="accent1"/>
+          </a:effectRef>
+          <a:fontRef idx="minor">
+            <a:schemeClr val="lt1"/>
+          </a:fontRef>
+        </p:style>
+        <p:txBody>
+          <a:bodyPr rtlCol="0" anchor="ctr"/>
+          <a:lstStyle/>
+          <a:p>
+            <a:pPr algn="ctr"/>
+            <a:endParaRPr lang="en-DK"/>
+          </a:p>
+        </p:txBody>
+      </p:sp>
+      <p:sp>
+        <p:nvSpPr>
+          <p:cNvPr id="10" name="Oval 9">
+            <a:extLst>
+              <a:ext uri="{FF2B5EF4-FFF2-40B4-BE49-F238E27FC236}">
+                <a16:creationId xmlns:a16="http://schemas.microsoft.com/office/drawing/2014/main" id="{EA74B1D4-633F-2DCF-CE09-8C175558079B}"/>
+              </a:ext>
+            </a:extLst>
+          </p:cNvPr>
+          <p:cNvSpPr/>
+          <p:nvPr/>
+        </p:nvSpPr>
+        <p:spPr>
+          <a:xfrm>
+            <a:off x="9686224" y="1791322"/>
+            <a:ext cx="252000" cy="252000"/>
+          </a:xfrm>
+          <a:prstGeom prst="ellipse">
+            <a:avLst/>
+          </a:prstGeom>
+          <a:noFill/>
+          <a:ln>
+            <a:solidFill>
+              <a:srgbClr val="FF0000"/>
+            </a:solidFill>
+          </a:ln>
+        </p:spPr>
+        <p:style>
+          <a:lnRef idx="2">
+            <a:schemeClr val="accent1">
+              <a:shade val="15000"/>
+            </a:schemeClr>
+          </a:lnRef>
+          <a:fillRef idx="1">
+            <a:schemeClr val="accent1"/>
+          </a:fillRef>
+          <a:effectRef idx="0">
+            <a:schemeClr val="accent1"/>
+          </a:effectRef>
+          <a:fontRef idx="minor">
+            <a:schemeClr val="lt1"/>
+          </a:fontRef>
+        </p:style>
+        <p:txBody>
+          <a:bodyPr rtlCol="0" anchor="ctr"/>
+          <a:lstStyle/>
+          <a:p>
+            <a:pPr algn="ctr"/>
+            <a:endParaRPr lang="en-DK"/>
+          </a:p>
+        </p:txBody>
+      </p:sp>
+      <p:sp>
+        <p:nvSpPr>
+          <p:cNvPr id="11" name="TextBox 10">
+            <a:extLst>
+              <a:ext uri="{FF2B5EF4-FFF2-40B4-BE49-F238E27FC236}">
+                <a16:creationId xmlns:a16="http://schemas.microsoft.com/office/drawing/2014/main" id="{53A67DBC-E614-5262-1C09-35C43BF5F295}"/>
+              </a:ext>
+            </a:extLst>
+          </p:cNvPr>
+          <p:cNvSpPr txBox="1"/>
+          <p:nvPr/>
+        </p:nvSpPr>
+        <p:spPr>
+          <a:xfrm>
+            <a:off x="1651404" y="469094"/>
+            <a:ext cx="4650889" cy="369332"/>
+          </a:xfrm>
+          <a:prstGeom prst="rect">
+            <a:avLst/>
+          </a:prstGeom>
+          <a:noFill/>
+        </p:spPr>
+        <p:txBody>
+          <a:bodyPr wrap="none" rtlCol="0">
+            <a:spAutoFit/>
+          </a:bodyPr>
+          <a:lstStyle/>
+          <a:p>
+            <a:r>
+              <a:rPr lang="en-GB" dirty="0"/>
+              <a:t>3. Check an LabBench I/O device is installed.</a:t>
+            </a:r>
+            <a:endParaRPr lang="en-DK" dirty="0"/>
+          </a:p>
+        </p:txBody>
+      </p:sp>
+      <p:sp>
+        <p:nvSpPr>
+          <p:cNvPr id="12" name="TextBox 11">
+            <a:extLst>
+              <a:ext uri="{FF2B5EF4-FFF2-40B4-BE49-F238E27FC236}">
+                <a16:creationId xmlns:a16="http://schemas.microsoft.com/office/drawing/2014/main" id="{3DF22890-E70F-FABE-9683-60A1B5964EA1}"/>
+              </a:ext>
+            </a:extLst>
+          </p:cNvPr>
+          <p:cNvSpPr txBox="1"/>
+          <p:nvPr/>
+        </p:nvSpPr>
+        <p:spPr>
+          <a:xfrm>
+            <a:off x="2756996" y="91405"/>
+            <a:ext cx="4017638" cy="369332"/>
+          </a:xfrm>
+          <a:prstGeom prst="rect">
+            <a:avLst/>
+          </a:prstGeom>
+          <a:noFill/>
+        </p:spPr>
+        <p:txBody>
+          <a:bodyPr wrap="none" rtlCol="0">
+            <a:spAutoFit/>
+          </a:bodyPr>
+          <a:lstStyle/>
+          <a:p>
+            <a:r>
+              <a:rPr lang="en-GB" dirty="0"/>
+              <a:t>4. If not, click the (+) add device button</a:t>
+            </a:r>
+            <a:endParaRPr lang="en-DK" dirty="0"/>
+          </a:p>
+        </p:txBody>
+      </p:sp>
+      <p:cxnSp>
+        <p:nvCxnSpPr>
+          <p:cNvPr id="14" name="Connector: Elbow 13">
+            <a:extLst>
+              <a:ext uri="{FF2B5EF4-FFF2-40B4-BE49-F238E27FC236}">
+                <a16:creationId xmlns:a16="http://schemas.microsoft.com/office/drawing/2014/main" id="{DD450608-F37A-4DFA-0292-EA78A9EC8A38}"/>
+              </a:ext>
+            </a:extLst>
+          </p:cNvPr>
+          <p:cNvCxnSpPr>
+            <a:cxnSpLocks/>
+            <a:stCxn id="12" idx="3"/>
+            <a:endCxn id="10" idx="0"/>
+          </p:cNvCxnSpPr>
+          <p:nvPr/>
+        </p:nvCxnSpPr>
+        <p:spPr>
+          <a:xfrm>
+            <a:off x="6774634" y="276071"/>
+            <a:ext cx="3037590" cy="1515251"/>
+          </a:xfrm>
+          <a:prstGeom prst="bentConnector2">
+            <a:avLst/>
+          </a:prstGeom>
+          <a:ln>
+            <a:solidFill>
+              <a:schemeClr val="tx1"/>
+            </a:solidFill>
+            <a:tailEnd type="triangle"/>
+          </a:ln>
+        </p:spPr>
+        <p:style>
+          <a:lnRef idx="2">
+            <a:schemeClr val="accent1"/>
+          </a:lnRef>
+          <a:fillRef idx="0">
+            <a:schemeClr val="accent1"/>
+          </a:fillRef>
+          <a:effectRef idx="1">
+            <a:schemeClr val="accent1"/>
+          </a:effectRef>
+          <a:fontRef idx="minor">
+            <a:schemeClr val="tx1"/>
+          </a:fontRef>
+        </p:style>
+      </p:cxnSp>
+      <p:cxnSp>
+        <p:nvCxnSpPr>
+          <p:cNvPr id="15" name="Connector: Elbow 14">
+            <a:extLst>
+              <a:ext uri="{FF2B5EF4-FFF2-40B4-BE49-F238E27FC236}">
+                <a16:creationId xmlns:a16="http://schemas.microsoft.com/office/drawing/2014/main" id="{471390FE-33E1-B819-4525-7D873A46DFF7}"/>
+              </a:ext>
+            </a:extLst>
+          </p:cNvPr>
+          <p:cNvCxnSpPr>
+            <a:cxnSpLocks/>
+            <a:stCxn id="11" idx="3"/>
+            <a:endCxn id="8" idx="0"/>
+          </p:cNvCxnSpPr>
+          <p:nvPr/>
+        </p:nvCxnSpPr>
+        <p:spPr>
+          <a:xfrm>
+            <a:off x="6302293" y="653760"/>
+            <a:ext cx="1919647" cy="1425161"/>
+          </a:xfrm>
+          <a:prstGeom prst="bentConnector2">
+            <a:avLst/>
+          </a:prstGeom>
+          <a:ln>
+            <a:solidFill>
+              <a:schemeClr val="tx1"/>
+            </a:solidFill>
+            <a:tailEnd type="triangle"/>
+          </a:ln>
+        </p:spPr>
+        <p:style>
+          <a:lnRef idx="2">
+            <a:schemeClr val="accent1"/>
+          </a:lnRef>
+          <a:fillRef idx="0">
+            <a:schemeClr val="accent1"/>
+          </a:fillRef>
+          <a:effectRef idx="1">
+            <a:schemeClr val="accent1"/>
+          </a:effectRef>
+          <a:fontRef idx="minor">
+            <a:schemeClr val="tx1"/>
+          </a:fontRef>
+        </p:style>
+      </p:cxnSp>
+      <p:cxnSp>
+        <p:nvCxnSpPr>
+          <p:cNvPr id="16" name="Connector: Elbow 15">
+            <a:extLst>
+              <a:ext uri="{FF2B5EF4-FFF2-40B4-BE49-F238E27FC236}">
+                <a16:creationId xmlns:a16="http://schemas.microsoft.com/office/drawing/2014/main" id="{523E325A-E038-58A3-0CA8-ED8DA6941E71}"/>
+              </a:ext>
+            </a:extLst>
+          </p:cNvPr>
+          <p:cNvCxnSpPr>
+            <a:cxnSpLocks/>
+            <a:stCxn id="5" idx="3"/>
+            <a:endCxn id="7" idx="0"/>
+          </p:cNvCxnSpPr>
+          <p:nvPr/>
+        </p:nvCxnSpPr>
+        <p:spPr>
+          <a:xfrm>
+            <a:off x="3468485" y="1028716"/>
+            <a:ext cx="1066939" cy="916654"/>
+          </a:xfrm>
+          <a:prstGeom prst="bentConnector2">
+            <a:avLst/>
+          </a:prstGeom>
+          <a:ln>
+            <a:solidFill>
+              <a:schemeClr val="tx1"/>
+            </a:solidFill>
+            <a:tailEnd type="triangle"/>
+          </a:ln>
+        </p:spPr>
+        <p:style>
+          <a:lnRef idx="2">
+            <a:schemeClr val="accent1"/>
+          </a:lnRef>
+          <a:fillRef idx="0">
+            <a:schemeClr val="accent1"/>
+          </a:fillRef>
+          <a:effectRef idx="1">
+            <a:schemeClr val="accent1"/>
+          </a:effectRef>
+          <a:fontRef idx="minor">
+            <a:schemeClr val="tx1"/>
+          </a:fontRef>
+        </p:style>
+      </p:cxnSp>
+      <p:cxnSp>
+        <p:nvCxnSpPr>
+          <p:cNvPr id="17" name="Connector: Elbow 16">
+            <a:extLst>
+              <a:ext uri="{FF2B5EF4-FFF2-40B4-BE49-F238E27FC236}">
+                <a16:creationId xmlns:a16="http://schemas.microsoft.com/office/drawing/2014/main" id="{86565227-0946-9B70-C821-5DBFBBC3B3A1}"/>
+              </a:ext>
+            </a:extLst>
+          </p:cNvPr>
+          <p:cNvCxnSpPr>
+            <a:cxnSpLocks/>
+            <a:stCxn id="4" idx="0"/>
+            <a:endCxn id="6" idx="1"/>
+          </p:cNvCxnSpPr>
+          <p:nvPr/>
+        </p:nvCxnSpPr>
+        <p:spPr>
+          <a:xfrm rot="5400000" flipH="1" flipV="1">
+            <a:off x="312174" y="3743067"/>
+            <a:ext cx="3150387" cy="541553"/>
+          </a:xfrm>
+          <a:prstGeom prst="bentConnector2">
+            <a:avLst/>
+          </a:prstGeom>
+          <a:ln>
+            <a:solidFill>
+              <a:schemeClr val="tx1"/>
+            </a:solidFill>
+            <a:tailEnd type="triangle"/>
+          </a:ln>
+        </p:spPr>
+        <p:style>
+          <a:lnRef idx="2">
+            <a:schemeClr val="accent1"/>
+          </a:lnRef>
+          <a:fillRef idx="0">
+            <a:schemeClr val="accent1"/>
+          </a:fillRef>
+          <a:effectRef idx="1">
+            <a:schemeClr val="accent1"/>
+          </a:effectRef>
+          <a:fontRef idx="minor">
+            <a:schemeClr val="tx1"/>
+          </a:fontRef>
+        </p:style>
+      </p:cxnSp>
+    </p:spTree>
+    <p:extLst>
+      <p:ext uri="{BB962C8B-B14F-4D97-AF65-F5344CB8AC3E}">
+        <p14:creationId xmlns:p14="http://schemas.microsoft.com/office/powerpoint/2010/main" val="1169293075"/>
+      </p:ext>
+    </p:extLst>
+  </p:cSld>
+  <p:clrMapOvr>
+    <a:masterClrMapping/>
+  </p:clrMapOvr>
+</p:sld>
+</file>
+
+<file path=ppt/slides/slide6.xml><?xml version="1.0" encoding="utf-8"?>
+<p:sld xmlns:a="http://schemas.openxmlformats.org/drawingml/2006/main" xmlns:r="http://schemas.openxmlformats.org/officeDocument/2006/relationships" xmlns:p="http://schemas.openxmlformats.org/presentationml/2006/main">
+  <p:cSld>
+    <p:spTree>
+      <p:nvGrpSpPr>
+        <p:cNvPr id="1" name=""/>
+        <p:cNvGrpSpPr/>
+        <p:nvPr/>
+      </p:nvGrpSpPr>
+      <p:grpSpPr>
+        <a:xfrm>
+          <a:off x="0" y="0"/>
+          <a:ext cx="0" cy="0"/>
+          <a:chOff x="0" y="0"/>
+          <a:chExt cx="0" cy="0"/>
+        </a:xfrm>
+      </p:grpSpPr>
+      <p:pic>
+        <p:nvPicPr>
+          <p:cNvPr id="3" name="Picture 2">
+            <a:extLst>
+              <a:ext uri="{FF2B5EF4-FFF2-40B4-BE49-F238E27FC236}">
+                <a16:creationId xmlns:a16="http://schemas.microsoft.com/office/drawing/2014/main" id="{F70C31DC-8C01-C63F-9293-9E47D2A76899}"/>
+              </a:ext>
+            </a:extLst>
+          </p:cNvPr>
+          <p:cNvPicPr>
+            <a:picLocks noChangeAspect="1"/>
+          </p:cNvPicPr>
+          <p:nvPr/>
+        </p:nvPicPr>
+        <p:blipFill rotWithShape="1">
+          <a:blip r:embed="rId2"/>
+          <a:srcRect b="37700"/>
+          <a:stretch/>
+        </p:blipFill>
+        <p:spPr>
+          <a:xfrm>
+            <a:off x="2481943" y="1644763"/>
+            <a:ext cx="6760077" cy="2223149"/>
+          </a:xfrm>
+          <a:prstGeom prst="rect">
+            <a:avLst/>
+          </a:prstGeom>
+        </p:spPr>
+      </p:pic>
+      <p:sp>
+        <p:nvSpPr>
+          <p:cNvPr id="4" name="TextBox 3">
+            <a:extLst>
+              <a:ext uri="{FF2B5EF4-FFF2-40B4-BE49-F238E27FC236}">
+                <a16:creationId xmlns:a16="http://schemas.microsoft.com/office/drawing/2014/main" id="{F00422E3-1F9E-E491-D93E-06A9BDBDF69D}"/>
+              </a:ext>
+            </a:extLst>
+          </p:cNvPr>
+          <p:cNvSpPr txBox="1"/>
+          <p:nvPr/>
+        </p:nvSpPr>
+        <p:spPr>
+          <a:xfrm>
+            <a:off x="492315" y="4231473"/>
+            <a:ext cx="3009991" cy="369332"/>
+          </a:xfrm>
+          <a:prstGeom prst="rect">
+            <a:avLst/>
+          </a:prstGeom>
+          <a:noFill/>
+        </p:spPr>
+        <p:txBody>
+          <a:bodyPr wrap="none" rtlCol="0">
+            <a:spAutoFit/>
+          </a:bodyPr>
+          <a:lstStyle/>
+          <a:p>
+            <a:r>
+              <a:rPr lang="en-GB" dirty="0"/>
+              <a:t>1. Select the Protocols page.</a:t>
+            </a:r>
+            <a:endParaRPr lang="en-DK" dirty="0"/>
+          </a:p>
+        </p:txBody>
+      </p:sp>
+      <p:sp>
+        <p:nvSpPr>
+          <p:cNvPr id="5" name="TextBox 4">
+            <a:extLst>
+              <a:ext uri="{FF2B5EF4-FFF2-40B4-BE49-F238E27FC236}">
+                <a16:creationId xmlns:a16="http://schemas.microsoft.com/office/drawing/2014/main" id="{73F9A642-BE35-BBD2-1ABC-D373DA1408B8}"/>
+              </a:ext>
+            </a:extLst>
+          </p:cNvPr>
+          <p:cNvSpPr txBox="1"/>
+          <p:nvPr/>
+        </p:nvSpPr>
+        <p:spPr>
+          <a:xfrm>
+            <a:off x="1364909" y="609641"/>
+            <a:ext cx="3704027" cy="369332"/>
+          </a:xfrm>
+          <a:prstGeom prst="rect">
+            <a:avLst/>
+          </a:prstGeom>
+          <a:noFill/>
+        </p:spPr>
+        <p:txBody>
+          <a:bodyPr wrap="none" rtlCol="0">
+            <a:spAutoFit/>
+          </a:bodyPr>
+          <a:lstStyle/>
+          <a:p>
+            <a:r>
+              <a:rPr lang="en-GB" dirty="0"/>
+              <a:t>2. Select the labbench.io repository</a:t>
+            </a:r>
+            <a:endParaRPr lang="en-DK" dirty="0"/>
+          </a:p>
+        </p:txBody>
+      </p:sp>
+      <p:sp>
+        <p:nvSpPr>
+          <p:cNvPr id="6" name="TextBox 5">
+            <a:extLst>
+              <a:ext uri="{FF2B5EF4-FFF2-40B4-BE49-F238E27FC236}">
+                <a16:creationId xmlns:a16="http://schemas.microsoft.com/office/drawing/2014/main" id="{4A60FAEF-A3D9-409A-1AC1-B2EC256E18F8}"/>
+              </a:ext>
+            </a:extLst>
+          </p:cNvPr>
+          <p:cNvSpPr txBox="1"/>
+          <p:nvPr/>
+        </p:nvSpPr>
+        <p:spPr>
+          <a:xfrm>
+            <a:off x="3445476" y="1179656"/>
+            <a:ext cx="3066865" cy="369332"/>
+          </a:xfrm>
+          <a:prstGeom prst="rect">
+            <a:avLst/>
+          </a:prstGeom>
+          <a:noFill/>
+        </p:spPr>
+        <p:txBody>
+          <a:bodyPr wrap="none" rtlCol="0">
+            <a:spAutoFit/>
+          </a:bodyPr>
+          <a:lstStyle/>
+          <a:p>
+            <a:r>
+              <a:rPr lang="en-GB" dirty="0"/>
+              <a:t>3. Select the Alloknesis protocol</a:t>
+            </a:r>
+            <a:endParaRPr lang="en-DK" dirty="0"/>
+          </a:p>
+        </p:txBody>
+      </p:sp>
+      <p:sp>
+        <p:nvSpPr>
+          <p:cNvPr id="7" name="TextBox 6">
+            <a:extLst>
+              <a:ext uri="{FF2B5EF4-FFF2-40B4-BE49-F238E27FC236}">
+                <a16:creationId xmlns:a16="http://schemas.microsoft.com/office/drawing/2014/main" id="{0F190E1D-721F-2D54-2AA9-5F715B54BF22}"/>
+              </a:ext>
+            </a:extLst>
+          </p:cNvPr>
+          <p:cNvSpPr txBox="1"/>
+          <p:nvPr/>
+        </p:nvSpPr>
+        <p:spPr>
+          <a:xfrm>
+            <a:off x="5114546" y="770602"/>
+            <a:ext cx="3691395" cy="369332"/>
+          </a:xfrm>
+          <a:prstGeom prst="rect">
+            <a:avLst/>
+          </a:prstGeom>
+          <a:noFill/>
+        </p:spPr>
+        <p:txBody>
+          <a:bodyPr wrap="none" rtlCol="0">
+            <a:spAutoFit/>
+          </a:bodyPr>
+          <a:lstStyle/>
+          <a:p>
+            <a:r>
+              <a:rPr lang="en-GB" dirty="0"/>
+              <a:t>4. Click (+) the add protocol button.</a:t>
+            </a:r>
+            <a:endParaRPr lang="en-DK" dirty="0"/>
+          </a:p>
+        </p:txBody>
+      </p:sp>
+      <p:sp>
+        <p:nvSpPr>
+          <p:cNvPr id="8" name="Rectangle 7">
+            <a:extLst>
+              <a:ext uri="{FF2B5EF4-FFF2-40B4-BE49-F238E27FC236}">
+                <a16:creationId xmlns:a16="http://schemas.microsoft.com/office/drawing/2014/main" id="{A5848E96-A62B-006B-7D4F-675A10EFC074}"/>
+              </a:ext>
+            </a:extLst>
+          </p:cNvPr>
+          <p:cNvSpPr/>
+          <p:nvPr/>
+        </p:nvSpPr>
+        <p:spPr>
+          <a:xfrm>
+            <a:off x="2481942" y="2563866"/>
+            <a:ext cx="431461" cy="369332"/>
+          </a:xfrm>
+          <a:prstGeom prst="rect">
+            <a:avLst/>
+          </a:prstGeom>
+          <a:noFill/>
+          <a:ln>
+            <a:solidFill>
+              <a:srgbClr val="FF0000"/>
+            </a:solidFill>
+          </a:ln>
+        </p:spPr>
+        <p:style>
+          <a:lnRef idx="2">
+            <a:schemeClr val="accent1">
+              <a:shade val="15000"/>
+            </a:schemeClr>
+          </a:lnRef>
+          <a:fillRef idx="1">
+            <a:schemeClr val="accent1"/>
+          </a:fillRef>
+          <a:effectRef idx="0">
+            <a:schemeClr val="accent1"/>
+          </a:effectRef>
+          <a:fontRef idx="minor">
+            <a:schemeClr val="lt1"/>
+          </a:fontRef>
+        </p:style>
+        <p:txBody>
+          <a:bodyPr rtlCol="0" anchor="ctr"/>
+          <a:lstStyle/>
+          <a:p>
+            <a:pPr algn="ctr"/>
+            <a:endParaRPr lang="en-DK"/>
+          </a:p>
+        </p:txBody>
+      </p:sp>
+      <p:sp>
+        <p:nvSpPr>
+          <p:cNvPr id="9" name="Rectangle 8">
+            <a:extLst>
+              <a:ext uri="{FF2B5EF4-FFF2-40B4-BE49-F238E27FC236}">
+                <a16:creationId xmlns:a16="http://schemas.microsoft.com/office/drawing/2014/main" id="{8F25BD4D-4951-6F46-71DB-C810D598948C}"/>
+              </a:ext>
+            </a:extLst>
+          </p:cNvPr>
+          <p:cNvSpPr/>
+          <p:nvPr/>
+        </p:nvSpPr>
+        <p:spPr>
+          <a:xfrm>
+            <a:off x="2949980" y="2103618"/>
+            <a:ext cx="1210540" cy="246390"/>
+          </a:xfrm>
+          <a:prstGeom prst="rect">
+            <a:avLst/>
+          </a:prstGeom>
+          <a:noFill/>
+          <a:ln>
+            <a:solidFill>
+              <a:srgbClr val="FF0000"/>
+            </a:solidFill>
+          </a:ln>
+        </p:spPr>
+        <p:style>
+          <a:lnRef idx="2">
+            <a:schemeClr val="accent1">
+              <a:shade val="15000"/>
+            </a:schemeClr>
+          </a:lnRef>
+          <a:fillRef idx="1">
+            <a:schemeClr val="accent1"/>
+          </a:fillRef>
+          <a:effectRef idx="0">
+            <a:schemeClr val="accent1"/>
+          </a:effectRef>
+          <a:fontRef idx="minor">
+            <a:schemeClr val="lt1"/>
+          </a:fontRef>
+        </p:style>
+        <p:txBody>
+          <a:bodyPr rtlCol="0" anchor="ctr"/>
+          <a:lstStyle/>
+          <a:p>
+            <a:pPr algn="ctr"/>
+            <a:endParaRPr lang="en-DK"/>
+          </a:p>
+        </p:txBody>
+      </p:sp>
+      <p:sp>
+        <p:nvSpPr>
+          <p:cNvPr id="10" name="Rectangle 9">
+            <a:extLst>
+              <a:ext uri="{FF2B5EF4-FFF2-40B4-BE49-F238E27FC236}">
+                <a16:creationId xmlns:a16="http://schemas.microsoft.com/office/drawing/2014/main" id="{3E226263-FD4D-CE53-616F-3976BC8747E4}"/>
+              </a:ext>
+            </a:extLst>
+          </p:cNvPr>
+          <p:cNvSpPr/>
+          <p:nvPr/>
+        </p:nvSpPr>
+        <p:spPr>
+          <a:xfrm>
+            <a:off x="4187952" y="2582154"/>
+            <a:ext cx="1581912" cy="481086"/>
+          </a:xfrm>
+          <a:prstGeom prst="rect">
+            <a:avLst/>
+          </a:prstGeom>
+          <a:noFill/>
+          <a:ln>
+            <a:solidFill>
+              <a:srgbClr val="FF0000"/>
+            </a:solidFill>
+          </a:ln>
+        </p:spPr>
+        <p:style>
+          <a:lnRef idx="2">
+            <a:schemeClr val="accent1">
+              <a:shade val="15000"/>
+            </a:schemeClr>
+          </a:lnRef>
+          <a:fillRef idx="1">
+            <a:schemeClr val="accent1"/>
+          </a:fillRef>
+          <a:effectRef idx="0">
+            <a:schemeClr val="accent1"/>
+          </a:effectRef>
+          <a:fontRef idx="minor">
+            <a:schemeClr val="lt1"/>
+          </a:fontRef>
+        </p:style>
+        <p:txBody>
+          <a:bodyPr rtlCol="0" anchor="ctr"/>
+          <a:lstStyle/>
+          <a:p>
+            <a:pPr algn="ctr"/>
+            <a:endParaRPr lang="en-DK"/>
+          </a:p>
+        </p:txBody>
+      </p:sp>
+      <p:cxnSp>
+        <p:nvCxnSpPr>
+          <p:cNvPr id="11" name="Connector: Elbow 10">
+            <a:extLst>
+              <a:ext uri="{FF2B5EF4-FFF2-40B4-BE49-F238E27FC236}">
+                <a16:creationId xmlns:a16="http://schemas.microsoft.com/office/drawing/2014/main" id="{718D3A55-90EB-2DDE-5385-90171D9C91D8}"/>
+              </a:ext>
+            </a:extLst>
+          </p:cNvPr>
+          <p:cNvCxnSpPr>
+            <a:cxnSpLocks/>
+            <a:stCxn id="4" idx="0"/>
+            <a:endCxn id="8" idx="1"/>
+          </p:cNvCxnSpPr>
+          <p:nvPr/>
+        </p:nvCxnSpPr>
+        <p:spPr>
+          <a:xfrm rot="5400000" flipH="1" flipV="1">
+            <a:off x="1498156" y="3247688"/>
+            <a:ext cx="1482941" cy="484631"/>
+          </a:xfrm>
+          <a:prstGeom prst="bentConnector2">
+            <a:avLst/>
+          </a:prstGeom>
+          <a:ln>
+            <a:solidFill>
+              <a:schemeClr val="tx1"/>
+            </a:solidFill>
+            <a:tailEnd type="triangle"/>
+          </a:ln>
+        </p:spPr>
+        <p:style>
+          <a:lnRef idx="2">
+            <a:schemeClr val="accent1"/>
+          </a:lnRef>
+          <a:fillRef idx="0">
+            <a:schemeClr val="accent1"/>
+          </a:fillRef>
+          <a:effectRef idx="1">
+            <a:schemeClr val="accent1"/>
+          </a:effectRef>
+          <a:fontRef idx="minor">
+            <a:schemeClr val="tx1"/>
+          </a:fontRef>
+        </p:style>
+      </p:cxnSp>
+      <p:cxnSp>
+        <p:nvCxnSpPr>
+          <p:cNvPr id="14" name="Connector: Elbow 13">
+            <a:extLst>
+              <a:ext uri="{FF2B5EF4-FFF2-40B4-BE49-F238E27FC236}">
+                <a16:creationId xmlns:a16="http://schemas.microsoft.com/office/drawing/2014/main" id="{FF7B2A8C-D07B-1454-364D-015D15E756A8}"/>
+              </a:ext>
+            </a:extLst>
+          </p:cNvPr>
+          <p:cNvCxnSpPr>
+            <a:cxnSpLocks/>
+            <a:stCxn id="5" idx="2"/>
+            <a:endCxn id="9" idx="0"/>
+          </p:cNvCxnSpPr>
+          <p:nvPr/>
+        </p:nvCxnSpPr>
+        <p:spPr>
+          <a:xfrm rot="16200000" flipH="1">
+            <a:off x="2823764" y="1372131"/>
+            <a:ext cx="1124645" cy="338327"/>
+          </a:xfrm>
+          <a:prstGeom prst="bentConnector3">
+            <a:avLst>
+              <a:gd name="adj1" fmla="val 50000"/>
+            </a:avLst>
+          </a:prstGeom>
+          <a:ln>
+            <a:solidFill>
+              <a:schemeClr val="tx1"/>
+            </a:solidFill>
+            <a:tailEnd type="triangle"/>
+          </a:ln>
+        </p:spPr>
+        <p:style>
+          <a:lnRef idx="2">
+            <a:schemeClr val="accent1"/>
+          </a:lnRef>
+          <a:fillRef idx="0">
+            <a:schemeClr val="accent1"/>
+          </a:fillRef>
+          <a:effectRef idx="1">
+            <a:schemeClr val="accent1"/>
+          </a:effectRef>
+          <a:fontRef idx="minor">
+            <a:schemeClr val="tx1"/>
+          </a:fontRef>
+        </p:style>
+      </p:cxnSp>
+      <p:cxnSp>
+        <p:nvCxnSpPr>
+          <p:cNvPr id="18" name="Connector: Elbow 17">
+            <a:extLst>
+              <a:ext uri="{FF2B5EF4-FFF2-40B4-BE49-F238E27FC236}">
+                <a16:creationId xmlns:a16="http://schemas.microsoft.com/office/drawing/2014/main" id="{ABE7F6E8-E08D-956E-CEBD-2F1AF713F7FF}"/>
+              </a:ext>
+            </a:extLst>
+          </p:cNvPr>
+          <p:cNvCxnSpPr>
+            <a:cxnSpLocks/>
+            <a:stCxn id="6" idx="2"/>
+            <a:endCxn id="10" idx="0"/>
+          </p:cNvCxnSpPr>
+          <p:nvPr/>
+        </p:nvCxnSpPr>
+        <p:spPr>
+          <a:xfrm rot="5400000">
+            <a:off x="4462326" y="2065571"/>
+            <a:ext cx="1033166" cy="1"/>
+          </a:xfrm>
+          <a:prstGeom prst="bentConnector3">
+            <a:avLst>
+              <a:gd name="adj1" fmla="val 50000"/>
+            </a:avLst>
+          </a:prstGeom>
+          <a:ln>
+            <a:solidFill>
+              <a:schemeClr val="tx1"/>
+            </a:solidFill>
+            <a:tailEnd type="triangle"/>
+          </a:ln>
+        </p:spPr>
+        <p:style>
+          <a:lnRef idx="2">
+            <a:schemeClr val="accent1"/>
+          </a:lnRef>
+          <a:fillRef idx="0">
+            <a:schemeClr val="accent1"/>
+          </a:fillRef>
+          <a:effectRef idx="1">
+            <a:schemeClr val="accent1"/>
+          </a:effectRef>
+          <a:fontRef idx="minor">
+            <a:schemeClr val="tx1"/>
+          </a:fontRef>
+        </p:style>
+      </p:cxnSp>
+      <p:sp>
+        <p:nvSpPr>
+          <p:cNvPr id="26" name="Oval 25">
+            <a:extLst>
+              <a:ext uri="{FF2B5EF4-FFF2-40B4-BE49-F238E27FC236}">
+                <a16:creationId xmlns:a16="http://schemas.microsoft.com/office/drawing/2014/main" id="{C975DFCE-570C-FF30-E87D-7F84545A7AC2}"/>
+              </a:ext>
+            </a:extLst>
+          </p:cNvPr>
+          <p:cNvSpPr/>
+          <p:nvPr/>
+        </p:nvSpPr>
+        <p:spPr>
+          <a:xfrm>
+            <a:off x="8924544" y="1910505"/>
+            <a:ext cx="192024" cy="143128"/>
+          </a:xfrm>
+          <a:prstGeom prst="ellipse">
+            <a:avLst/>
+          </a:prstGeom>
+          <a:noFill/>
+          <a:ln>
+            <a:solidFill>
+              <a:srgbClr val="FF0000"/>
+            </a:solidFill>
+          </a:ln>
+        </p:spPr>
+        <p:style>
+          <a:lnRef idx="2">
+            <a:schemeClr val="accent1">
+              <a:shade val="15000"/>
+            </a:schemeClr>
+          </a:lnRef>
+          <a:fillRef idx="1">
+            <a:schemeClr val="accent1"/>
+          </a:fillRef>
+          <a:effectRef idx="0">
+            <a:schemeClr val="accent1"/>
+          </a:effectRef>
+          <a:fontRef idx="minor">
+            <a:schemeClr val="lt1"/>
+          </a:fontRef>
+        </p:style>
+        <p:txBody>
+          <a:bodyPr rtlCol="0" anchor="ctr"/>
+          <a:lstStyle/>
+          <a:p>
+            <a:pPr algn="ctr"/>
+            <a:endParaRPr lang="en-DK"/>
+          </a:p>
+        </p:txBody>
+      </p:sp>
+      <p:cxnSp>
+        <p:nvCxnSpPr>
+          <p:cNvPr id="27" name="Connector: Elbow 26">
+            <a:extLst>
+              <a:ext uri="{FF2B5EF4-FFF2-40B4-BE49-F238E27FC236}">
+                <a16:creationId xmlns:a16="http://schemas.microsoft.com/office/drawing/2014/main" id="{092436F1-CAFD-0656-4895-2F4298389448}"/>
+              </a:ext>
+            </a:extLst>
+          </p:cNvPr>
+          <p:cNvCxnSpPr>
+            <a:cxnSpLocks/>
+            <a:stCxn id="7" idx="3"/>
+            <a:endCxn id="26" idx="0"/>
+          </p:cNvCxnSpPr>
+          <p:nvPr/>
+        </p:nvCxnSpPr>
+        <p:spPr>
+          <a:xfrm>
+            <a:off x="8805941" y="955268"/>
+            <a:ext cx="214615" cy="955237"/>
+          </a:xfrm>
+          <a:prstGeom prst="bentConnector2">
+            <a:avLst/>
+          </a:prstGeom>
+          <a:ln>
+            <a:solidFill>
+              <a:schemeClr val="tx1"/>
+            </a:solidFill>
+            <a:tailEnd type="triangle"/>
+          </a:ln>
+        </p:spPr>
+        <p:style>
+          <a:lnRef idx="2">
+            <a:schemeClr val="accent1"/>
+          </a:lnRef>
+          <a:fillRef idx="0">
+            <a:schemeClr val="accent1"/>
+          </a:fillRef>
+          <a:effectRef idx="1">
+            <a:schemeClr val="accent1"/>
+          </a:effectRef>
+          <a:fontRef idx="minor">
+            <a:schemeClr val="tx1"/>
+          </a:fontRef>
+        </p:style>
+      </p:cxnSp>
+    </p:spTree>
+    <p:extLst>
+      <p:ext uri="{BB962C8B-B14F-4D97-AF65-F5344CB8AC3E}">
+        <p14:creationId xmlns:p14="http://schemas.microsoft.com/office/powerpoint/2010/main" val="3293112550"/>
       </p:ext>
     </p:extLst>
   </p:cSld>
@@ -4407,4 +6569,319 @@
     </a:ext>
   </a:extLst>
 </a:theme>
+</file>
+
+<file path=ppt/theme/theme2.xml><?xml version="1.0" encoding="utf-8"?>
+<a:theme xmlns:a="http://schemas.openxmlformats.org/drawingml/2006/main" name="Office Theme">
+  <a:themeElements>
+    <a:clrScheme name="Office">
+      <a:dk1>
+        <a:sysClr val="windowText" lastClr="000000"/>
+      </a:dk1>
+      <a:lt1>
+        <a:sysClr val="window" lastClr="FFFFFF"/>
+      </a:lt1>
+      <a:dk2>
+        <a:srgbClr val="0E2841"/>
+      </a:dk2>
+      <a:lt2>
+        <a:srgbClr val="E8E8E8"/>
+      </a:lt2>
+      <a:accent1>
+        <a:srgbClr val="156082"/>
+      </a:accent1>
+      <a:accent2>
+        <a:srgbClr val="E97132"/>
+      </a:accent2>
+      <a:accent3>
+        <a:srgbClr val="196B24"/>
+      </a:accent3>
+      <a:accent4>
+        <a:srgbClr val="0F9ED5"/>
+      </a:accent4>
+      <a:accent5>
+        <a:srgbClr val="A02B93"/>
+      </a:accent5>
+      <a:accent6>
+        <a:srgbClr val="4EA72E"/>
+      </a:accent6>
+      <a:hlink>
+        <a:srgbClr val="467886"/>
+      </a:hlink>
+      <a:folHlink>
+        <a:srgbClr val="96607D"/>
+      </a:folHlink>
+    </a:clrScheme>
+    <a:fontScheme name="Office">
+      <a:majorFont>
+        <a:latin typeface="Aptos Display" panose="02110004020202020204"/>
+        <a:ea typeface=""/>
+        <a:cs typeface=""/>
+        <a:font script="Jpan" typeface="游ゴシック Light"/>
+        <a:font script="Hang" typeface="맑은 고딕"/>
+        <a:font script="Hans" typeface="等线 Light"/>
+        <a:font script="Hant" typeface="新細明體"/>
+        <a:font script="Arab" typeface="Times New Roman"/>
+        <a:font script="Hebr" typeface="Times New Roman"/>
+        <a:font script="Thai" typeface="Angsana New"/>
+        <a:font script="Ethi" typeface="Nyala"/>
+        <a:font script="Beng" typeface="Vrinda"/>
+        <a:font script="Gujr" typeface="Shruti"/>
+        <a:font script="Khmr" typeface="MoolBoran"/>
+        <a:font script="Knda" typeface="Tunga"/>
+        <a:font script="Guru" typeface="Raavi"/>
+        <a:font script="Cans" typeface="Euphemia"/>
+        <a:font script="Cher" typeface="Plantagenet Cherokee"/>
+        <a:font script="Yiii" typeface="Microsoft Yi Baiti"/>
+        <a:font script="Tibt" typeface="Microsoft Himalaya"/>
+        <a:font script="Thaa" typeface="MV Boli"/>
+        <a:font script="Deva" typeface="Mangal"/>
+        <a:font script="Telu" typeface="Gautami"/>
+        <a:font script="Taml" typeface="Latha"/>
+        <a:font script="Syrc" typeface="Estrangelo Edessa"/>
+        <a:font script="Orya" typeface="Kalinga"/>
+        <a:font script="Mlym" typeface="Kartika"/>
+        <a:font script="Laoo" typeface="DokChampa"/>
+        <a:font script="Sinh" typeface="Iskoola Pota"/>
+        <a:font script="Mong" typeface="Mongolian Baiti"/>
+        <a:font script="Viet" typeface="Times New Roman"/>
+        <a:font script="Uigh" typeface="Microsoft Uighur"/>
+        <a:font script="Geor" typeface="Sylfaen"/>
+        <a:font script="Armn" typeface="Arial"/>
+        <a:font script="Bugi" typeface="Leelawadee UI"/>
+        <a:font script="Bopo" typeface="Microsoft JhengHei"/>
+        <a:font script="Java" typeface="Javanese Text"/>
+        <a:font script="Lisu" typeface="Segoe UI"/>
+        <a:font script="Mymr" typeface="Myanmar Text"/>
+        <a:font script="Nkoo" typeface="Ebrima"/>
+        <a:font script="Olck" typeface="Nirmala UI"/>
+        <a:font script="Osma" typeface="Ebrima"/>
+        <a:font script="Phag" typeface="Phagspa"/>
+        <a:font script="Syrn" typeface="Estrangelo Edessa"/>
+        <a:font script="Syrj" typeface="Estrangelo Edessa"/>
+        <a:font script="Syre" typeface="Estrangelo Edessa"/>
+        <a:font script="Sora" typeface="Nirmala UI"/>
+        <a:font script="Tale" typeface="Microsoft Tai Le"/>
+        <a:font script="Talu" typeface="Microsoft New Tai Lue"/>
+        <a:font script="Tfng" typeface="Ebrima"/>
+      </a:majorFont>
+      <a:minorFont>
+        <a:latin typeface="Aptos" panose="02110004020202020204"/>
+        <a:ea typeface=""/>
+        <a:cs typeface=""/>
+        <a:font script="Jpan" typeface="游ゴシック"/>
+        <a:font script="Hang" typeface="맑은 고딕"/>
+        <a:font script="Hans" typeface="等线"/>
+        <a:font script="Hant" typeface="新細明體"/>
+        <a:font script="Arab" typeface="Arial"/>
+        <a:font script="Hebr" typeface="Arial"/>
+        <a:font script="Thai" typeface="Cordia New"/>
+        <a:font script="Ethi" typeface="Nyala"/>
+        <a:font script="Beng" typeface="Vrinda"/>
+        <a:font script="Gujr" typeface="Shruti"/>
+        <a:font script="Khmr" typeface="DaunPenh"/>
+        <a:font script="Knda" typeface="Tunga"/>
+        <a:font script="Guru" typeface="Raavi"/>
+        <a:font script="Cans" typeface="Euphemia"/>
+        <a:font script="Cher" typeface="Plantagenet Cherokee"/>
+        <a:font script="Yiii" typeface="Microsoft Yi Baiti"/>
+        <a:font script="Tibt" typeface="Microsoft Himalaya"/>
+        <a:font script="Thaa" typeface="MV Boli"/>
+        <a:font script="Deva" typeface="Mangal"/>
+        <a:font script="Telu" typeface="Gautami"/>
+        <a:font script="Taml" typeface="Latha"/>
+        <a:font script="Syrc" typeface="Estrangelo Edessa"/>
+        <a:font script="Orya" typeface="Kalinga"/>
+        <a:font script="Mlym" typeface="Kartika"/>
+        <a:font script="Laoo" typeface="DokChampa"/>
+        <a:font script="Sinh" typeface="Iskoola Pota"/>
+        <a:font script="Mong" typeface="Mongolian Baiti"/>
+        <a:font script="Viet" typeface="Arial"/>
+        <a:font script="Uigh" typeface="Microsoft Uighur"/>
+        <a:font script="Geor" typeface="Sylfaen"/>
+        <a:font script="Armn" typeface="Arial"/>
+        <a:font script="Bugi" typeface="Leelawadee UI"/>
+        <a:font script="Bopo" typeface="Microsoft JhengHei"/>
+        <a:font script="Java" typeface="Javanese Text"/>
+        <a:font script="Lisu" typeface="Segoe UI"/>
+        <a:font script="Mymr" typeface="Myanmar Text"/>
+        <a:font script="Nkoo" typeface="Ebrima"/>
+        <a:font script="Olck" typeface="Nirmala UI"/>
+        <a:font script="Osma" typeface="Ebrima"/>
+        <a:font script="Phag" typeface="Phagspa"/>
+        <a:font script="Syrn" typeface="Estrangelo Edessa"/>
+        <a:font script="Syrj" typeface="Estrangelo Edessa"/>
+        <a:font script="Syre" typeface="Estrangelo Edessa"/>
+        <a:font script="Sora" typeface="Nirmala UI"/>
+        <a:font script="Tale" typeface="Microsoft Tai Le"/>
+        <a:font script="Talu" typeface="Microsoft New Tai Lue"/>
+        <a:font script="Tfng" typeface="Ebrima"/>
+      </a:minorFont>
+    </a:fontScheme>
+    <a:fmtScheme name="Office">
+      <a:fillStyleLst>
+        <a:solidFill>
+          <a:schemeClr val="phClr"/>
+        </a:solidFill>
+        <a:gradFill rotWithShape="1">
+          <a:gsLst>
+            <a:gs pos="0">
+              <a:schemeClr val="phClr">
+                <a:lumMod val="110000"/>
+                <a:satMod val="105000"/>
+                <a:tint val="67000"/>
+              </a:schemeClr>
+            </a:gs>
+            <a:gs pos="50000">
+              <a:schemeClr val="phClr">
+                <a:lumMod val="105000"/>
+                <a:satMod val="103000"/>
+                <a:tint val="73000"/>
+              </a:schemeClr>
+            </a:gs>
+            <a:gs pos="100000">
+              <a:schemeClr val="phClr">
+                <a:lumMod val="105000"/>
+                <a:satMod val="109000"/>
+                <a:tint val="81000"/>
+              </a:schemeClr>
+            </a:gs>
+          </a:gsLst>
+          <a:lin ang="5400000" scaled="0"/>
+        </a:gradFill>
+        <a:gradFill rotWithShape="1">
+          <a:gsLst>
+            <a:gs pos="0">
+              <a:schemeClr val="phClr">
+                <a:satMod val="103000"/>
+                <a:lumMod val="102000"/>
+                <a:tint val="94000"/>
+              </a:schemeClr>
+            </a:gs>
+            <a:gs pos="50000">
+              <a:schemeClr val="phClr">
+                <a:satMod val="110000"/>
+                <a:lumMod val="100000"/>
+                <a:shade val="100000"/>
+              </a:schemeClr>
+            </a:gs>
+            <a:gs pos="100000">
+              <a:schemeClr val="phClr">
+                <a:lumMod val="99000"/>
+                <a:satMod val="120000"/>
+                <a:shade val="78000"/>
+              </a:schemeClr>
+            </a:gs>
+          </a:gsLst>
+          <a:lin ang="5400000" scaled="0"/>
+        </a:gradFill>
+      </a:fillStyleLst>
+      <a:lnStyleLst>
+        <a:ln w="12700" cap="flat" cmpd="sng" algn="ctr">
+          <a:solidFill>
+            <a:schemeClr val="phClr"/>
+          </a:solidFill>
+          <a:prstDash val="solid"/>
+          <a:miter lim="800000"/>
+        </a:ln>
+        <a:ln w="19050" cap="flat" cmpd="sng" algn="ctr">
+          <a:solidFill>
+            <a:schemeClr val="phClr"/>
+          </a:solidFill>
+          <a:prstDash val="solid"/>
+          <a:miter lim="800000"/>
+        </a:ln>
+        <a:ln w="25400" cap="flat" cmpd="sng" algn="ctr">
+          <a:solidFill>
+            <a:schemeClr val="phClr"/>
+          </a:solidFill>
+          <a:prstDash val="solid"/>
+          <a:miter lim="800000"/>
+        </a:ln>
+      </a:lnStyleLst>
+      <a:effectStyleLst>
+        <a:effectStyle>
+          <a:effectLst/>
+        </a:effectStyle>
+        <a:effectStyle>
+          <a:effectLst/>
+        </a:effectStyle>
+        <a:effectStyle>
+          <a:effectLst>
+            <a:outerShdw blurRad="57150" dist="19050" dir="5400000" algn="ctr" rotWithShape="0">
+              <a:srgbClr val="000000">
+                <a:alpha val="63000"/>
+              </a:srgbClr>
+            </a:outerShdw>
+          </a:effectLst>
+        </a:effectStyle>
+      </a:effectStyleLst>
+      <a:bgFillStyleLst>
+        <a:solidFill>
+          <a:schemeClr val="phClr"/>
+        </a:solidFill>
+        <a:solidFill>
+          <a:schemeClr val="phClr">
+            <a:tint val="95000"/>
+            <a:satMod val="170000"/>
+          </a:schemeClr>
+        </a:solidFill>
+        <a:gradFill rotWithShape="1">
+          <a:gsLst>
+            <a:gs pos="0">
+              <a:schemeClr val="phClr">
+                <a:tint val="93000"/>
+                <a:satMod val="150000"/>
+                <a:shade val="98000"/>
+                <a:lumMod val="102000"/>
+              </a:schemeClr>
+            </a:gs>
+            <a:gs pos="50000">
+              <a:schemeClr val="phClr">
+                <a:tint val="98000"/>
+                <a:satMod val="130000"/>
+                <a:shade val="90000"/>
+                <a:lumMod val="103000"/>
+              </a:schemeClr>
+            </a:gs>
+            <a:gs pos="100000">
+              <a:schemeClr val="phClr">
+                <a:shade val="63000"/>
+                <a:satMod val="120000"/>
+              </a:schemeClr>
+            </a:gs>
+          </a:gsLst>
+          <a:lin ang="5400000" scaled="0"/>
+        </a:gradFill>
+      </a:bgFillStyleLst>
+    </a:fmtScheme>
+  </a:themeElements>
+  <a:objectDefaults>
+    <a:lnDef>
+      <a:spPr/>
+      <a:bodyPr/>
+      <a:lstStyle/>
+      <a:style>
+        <a:lnRef idx="2">
+          <a:schemeClr val="accent1"/>
+        </a:lnRef>
+        <a:fillRef idx="0">
+          <a:schemeClr val="accent1"/>
+        </a:fillRef>
+        <a:effectRef idx="1">
+          <a:schemeClr val="accent1"/>
+        </a:effectRef>
+        <a:fontRef idx="minor">
+          <a:schemeClr val="tx1"/>
+        </a:fontRef>
+      </a:style>
+    </a:lnDef>
+  </a:objectDefaults>
+  <a:extraClrSchemeLst/>
+  <a:extLst>
+    <a:ext uri="{05A4C25C-085E-4340-85A3-A5531E510DB2}">
+      <thm15:themeFamily xmlns:thm15="http://schemas.microsoft.com/office/thememl/2012/main" name="Office Theme" id="{2E142A2C-CD16-42D6-873A-C26D2A0506FA}" vid="{1BDDFF52-6CD6-40A5-AB3C-68EB2F1E4D0A}"/>
+    </a:ext>
+  </a:extLst>
+</a:theme>
 </file>
</xml_diff>

<commit_message>
Miner formatting of alloknesis description
</commit_message>
<xml_diff>
--- a/docs/alloknesisDemo/Illustrations.pptx
+++ b/docs/alloknesisDemo/Illustrations.pptx
@@ -202,7 +202,7 @@
           <a:p>
             <a:fld id="{AD18F073-7BE0-4F74-9518-670EA3BF62D9}" type="datetimeFigureOut">
               <a:rPr lang="en-DK" smtClean="0"/>
-              <a:t>22/04/2024</a:t>
+              <a:t>24/04/2024</a:t>
             </a:fld>
             <a:endParaRPr lang="en-DK"/>
           </a:p>
@@ -707,7 +707,7 @@
           <a:p>
             <a:fld id="{FC494E8C-FC75-41A8-A75A-6DCBE54C971A}" type="datetimeFigureOut">
               <a:rPr lang="en-DK" smtClean="0"/>
-              <a:t>22/04/2024</a:t>
+              <a:t>24/04/2024</a:t>
             </a:fld>
             <a:endParaRPr lang="en-DK"/>
           </a:p>
@@ -907,7 +907,7 @@
           <a:p>
             <a:fld id="{FC494E8C-FC75-41A8-A75A-6DCBE54C971A}" type="datetimeFigureOut">
               <a:rPr lang="en-DK" smtClean="0"/>
-              <a:t>22/04/2024</a:t>
+              <a:t>24/04/2024</a:t>
             </a:fld>
             <a:endParaRPr lang="en-DK"/>
           </a:p>
@@ -1117,7 +1117,7 @@
           <a:p>
             <a:fld id="{FC494E8C-FC75-41A8-A75A-6DCBE54C971A}" type="datetimeFigureOut">
               <a:rPr lang="en-DK" smtClean="0"/>
-              <a:t>22/04/2024</a:t>
+              <a:t>24/04/2024</a:t>
             </a:fld>
             <a:endParaRPr lang="en-DK"/>
           </a:p>
@@ -1317,7 +1317,7 @@
           <a:p>
             <a:fld id="{FC494E8C-FC75-41A8-A75A-6DCBE54C971A}" type="datetimeFigureOut">
               <a:rPr lang="en-DK" smtClean="0"/>
-              <a:t>22/04/2024</a:t>
+              <a:t>24/04/2024</a:t>
             </a:fld>
             <a:endParaRPr lang="en-DK"/>
           </a:p>
@@ -1593,7 +1593,7 @@
           <a:p>
             <a:fld id="{FC494E8C-FC75-41A8-A75A-6DCBE54C971A}" type="datetimeFigureOut">
               <a:rPr lang="en-DK" smtClean="0"/>
-              <a:t>22/04/2024</a:t>
+              <a:t>24/04/2024</a:t>
             </a:fld>
             <a:endParaRPr lang="en-DK"/>
           </a:p>
@@ -1861,7 +1861,7 @@
           <a:p>
             <a:fld id="{FC494E8C-FC75-41A8-A75A-6DCBE54C971A}" type="datetimeFigureOut">
               <a:rPr lang="en-DK" smtClean="0"/>
-              <a:t>22/04/2024</a:t>
+              <a:t>24/04/2024</a:t>
             </a:fld>
             <a:endParaRPr lang="en-DK"/>
           </a:p>
@@ -2276,7 +2276,7 @@
           <a:p>
             <a:fld id="{FC494E8C-FC75-41A8-A75A-6DCBE54C971A}" type="datetimeFigureOut">
               <a:rPr lang="en-DK" smtClean="0"/>
-              <a:t>22/04/2024</a:t>
+              <a:t>24/04/2024</a:t>
             </a:fld>
             <a:endParaRPr lang="en-DK"/>
           </a:p>
@@ -2418,7 +2418,7 @@
           <a:p>
             <a:fld id="{FC494E8C-FC75-41A8-A75A-6DCBE54C971A}" type="datetimeFigureOut">
               <a:rPr lang="en-DK" smtClean="0"/>
-              <a:t>22/04/2024</a:t>
+              <a:t>24/04/2024</a:t>
             </a:fld>
             <a:endParaRPr lang="en-DK"/>
           </a:p>
@@ -2531,7 +2531,7 @@
           <a:p>
             <a:fld id="{FC494E8C-FC75-41A8-A75A-6DCBE54C971A}" type="datetimeFigureOut">
               <a:rPr lang="en-DK" smtClean="0"/>
-              <a:t>22/04/2024</a:t>
+              <a:t>24/04/2024</a:t>
             </a:fld>
             <a:endParaRPr lang="en-DK"/>
           </a:p>
@@ -2844,7 +2844,7 @@
           <a:p>
             <a:fld id="{FC494E8C-FC75-41A8-A75A-6DCBE54C971A}" type="datetimeFigureOut">
               <a:rPr lang="en-DK" smtClean="0"/>
-              <a:t>22/04/2024</a:t>
+              <a:t>24/04/2024</a:t>
             </a:fld>
             <a:endParaRPr lang="en-DK"/>
           </a:p>
@@ -3133,7 +3133,7 @@
           <a:p>
             <a:fld id="{FC494E8C-FC75-41A8-A75A-6DCBE54C971A}" type="datetimeFigureOut">
               <a:rPr lang="en-DK" smtClean="0"/>
-              <a:t>22/04/2024</a:t>
+              <a:t>24/04/2024</a:t>
             </a:fld>
             <a:endParaRPr lang="en-DK"/>
           </a:p>
@@ -3376,7 +3376,7 @@
           <a:p>
             <a:fld id="{FC494E8C-FC75-41A8-A75A-6DCBE54C971A}" type="datetimeFigureOut">
               <a:rPr lang="en-DK" smtClean="0"/>
-              <a:t>22/04/2024</a:t>
+              <a:t>24/04/2024</a:t>
             </a:fld>
             <a:endParaRPr lang="en-DK"/>
           </a:p>
@@ -5709,10 +5709,10 @@
       </p:grpSpPr>
       <p:pic>
         <p:nvPicPr>
-          <p:cNvPr id="3" name="Picture 2">
-            <a:extLst>
-              <a:ext uri="{FF2B5EF4-FFF2-40B4-BE49-F238E27FC236}">
-                <a16:creationId xmlns:a16="http://schemas.microsoft.com/office/drawing/2014/main" id="{F70C31DC-8C01-C63F-9293-9E47D2A76899}"/>
+          <p:cNvPr id="17" name="Picture 16">
+            <a:extLst>
+              <a:ext uri="{FF2B5EF4-FFF2-40B4-BE49-F238E27FC236}">
+                <a16:creationId xmlns:a16="http://schemas.microsoft.com/office/drawing/2014/main" id="{445992C0-F74B-839C-FEBF-19BD9A68CA88}"/>
               </a:ext>
             </a:extLst>
           </p:cNvPr>
@@ -5723,13 +5723,13 @@
         </p:nvPicPr>
         <p:blipFill rotWithShape="1">
           <a:blip r:embed="rId2"/>
-          <a:srcRect b="37700"/>
+          <a:srcRect b="38704"/>
           <a:stretch/>
         </p:blipFill>
         <p:spPr>
           <a:xfrm>
-            <a:off x="2481943" y="1644763"/>
-            <a:ext cx="6760077" cy="2223149"/>
+            <a:off x="2481940" y="1646601"/>
+            <a:ext cx="6705182" cy="2215540"/>
           </a:xfrm>
           <a:prstGeom prst="rect">
             <a:avLst/>
@@ -5894,8 +5894,8 @@
         </p:nvSpPr>
         <p:spPr>
           <a:xfrm>
-            <a:off x="2481942" y="2563866"/>
-            <a:ext cx="431461" cy="369332"/>
+            <a:off x="2481940" y="2379200"/>
+            <a:ext cx="373905" cy="322001"/>
           </a:xfrm>
           <a:prstGeom prst="rect">
             <a:avLst/>
@@ -5946,8 +5946,8 @@
         </p:nvSpPr>
         <p:spPr>
           <a:xfrm>
-            <a:off x="2949980" y="2103618"/>
-            <a:ext cx="1210540" cy="246390"/>
+            <a:off x="2855845" y="2001079"/>
+            <a:ext cx="1251731" cy="193455"/>
           </a:xfrm>
           <a:prstGeom prst="rect">
             <a:avLst/>
@@ -5998,8 +5998,8 @@
         </p:nvSpPr>
         <p:spPr>
           <a:xfrm>
-            <a:off x="4187952" y="2582154"/>
-            <a:ext cx="1581912" cy="481086"/>
+            <a:off x="4114202" y="2316697"/>
+            <a:ext cx="1581912" cy="307233"/>
           </a:xfrm>
           <a:prstGeom prst="rect">
             <a:avLst/>
@@ -6054,8 +6054,8 @@
         </p:nvCxnSpPr>
         <p:spPr>
           <a:xfrm rot="5400000" flipH="1" flipV="1">
-            <a:off x="1498156" y="3247688"/>
-            <a:ext cx="1482941" cy="484631"/>
+            <a:off x="1393989" y="3143523"/>
+            <a:ext cx="1691272" cy="484629"/>
           </a:xfrm>
           <a:prstGeom prst="bentConnector2">
             <a:avLst/>
@@ -6100,8 +6100,8 @@
         </p:nvCxnSpPr>
         <p:spPr>
           <a:xfrm rot="16200000" flipH="1">
-            <a:off x="2823764" y="1372131"/>
-            <a:ext cx="1124645" cy="338327"/>
+            <a:off x="2838264" y="1357632"/>
+            <a:ext cx="1022106" cy="264788"/>
           </a:xfrm>
           <a:prstGeom prst="bentConnector3">
             <a:avLst>
@@ -6148,8 +6148,8 @@
         </p:nvCxnSpPr>
         <p:spPr>
           <a:xfrm rot="5400000">
-            <a:off x="4462326" y="2065571"/>
-            <a:ext cx="1033166" cy="1"/>
+            <a:off x="4558180" y="1895967"/>
+            <a:ext cx="767709" cy="73751"/>
           </a:xfrm>
           <a:prstGeom prst="bentConnector3">
             <a:avLst>
@@ -6192,7 +6192,7 @@
         </p:nvSpPr>
         <p:spPr>
           <a:xfrm>
-            <a:off x="8924544" y="1910505"/>
+            <a:off x="8911292" y="1838507"/>
             <a:ext cx="192024" cy="143128"/>
           </a:xfrm>
           <a:prstGeom prst="ellipse">
@@ -6249,7 +6249,7 @@
         <p:spPr>
           <a:xfrm>
             <a:off x="8805941" y="955268"/>
-            <a:ext cx="214615" cy="955237"/>
+            <a:ext cx="201363" cy="883239"/>
           </a:xfrm>
           <a:prstGeom prst="bentConnector2">
             <a:avLst/>

</xml_diff>